<commit_message>
2019 update of exercise files
</commit_message>
<xml_diff>
--- a/tutorial/LaTeX_Takacs.pptx
+++ b/tutorial/LaTeX_Takacs.pptx
@@ -22,10 +22,10 @@
     <p:sldId id="286" r:id="rId10"/>
     <p:sldId id="282" r:id="rId11"/>
     <p:sldId id="283" r:id="rId12"/>
-    <p:sldId id="258" r:id="rId13"/>
-    <p:sldId id="287" r:id="rId14"/>
-    <p:sldId id="270" r:id="rId15"/>
-    <p:sldId id="259" r:id="rId16"/>
+    <p:sldId id="287" r:id="rId13"/>
+    <p:sldId id="258" r:id="rId14"/>
+    <p:sldId id="259" r:id="rId15"/>
+    <p:sldId id="270" r:id="rId16"/>
     <p:sldId id="267" r:id="rId17"/>
     <p:sldId id="268" r:id="rId18"/>
     <p:sldId id="278" r:id="rId19"/>
@@ -328,7 +328,7 @@
               <a:pPr>
                 <a:defRPr/>
               </a:pPr>
-              <a:t>10. 12. 2018</a:t>
+              <a:t>16. 12. 2019</a:t>
             </a:fld>
             <a:endParaRPr lang="sk-SK"/>
           </a:p>
@@ -878,6 +878,96 @@
 </p:notesMaster>
 </file>
 
+<file path=ppt/notesSlides/notesSlide1.xml><?xml version="1.0" encoding="utf-8"?>
+<p:notes xmlns:a="http://schemas.openxmlformats.org/drawingml/2006/main" xmlns:r="http://schemas.openxmlformats.org/officeDocument/2006/relationships" xmlns:p="http://schemas.openxmlformats.org/presentationml/2006/main">
+  <p:cSld>
+    <p:spTree>
+      <p:nvGrpSpPr>
+        <p:cNvPr id="1" name=""/>
+        <p:cNvGrpSpPr/>
+        <p:nvPr/>
+      </p:nvGrpSpPr>
+      <p:grpSpPr>
+        <a:xfrm>
+          <a:off x="0" y="0"/>
+          <a:ext cx="0" cy="0"/>
+          <a:chOff x="0" y="0"/>
+          <a:chExt cx="0" cy="0"/>
+        </a:xfrm>
+      </p:grpSpPr>
+      <p:sp>
+        <p:nvSpPr>
+          <p:cNvPr id="2" name="Slide Image Placeholder 1"/>
+          <p:cNvSpPr>
+            <a:spLocks noGrp="1" noRot="1" noChangeAspect="1"/>
+          </p:cNvSpPr>
+          <p:nvPr>
+            <p:ph type="sldImg"/>
+          </p:nvPr>
+        </p:nvSpPr>
+        <p:spPr/>
+      </p:sp>
+      <p:sp>
+        <p:nvSpPr>
+          <p:cNvPr id="3" name="Notes Placeholder 2"/>
+          <p:cNvSpPr>
+            <a:spLocks noGrp="1"/>
+          </p:cNvSpPr>
+          <p:nvPr>
+            <p:ph type="body" idx="1"/>
+          </p:nvPr>
+        </p:nvSpPr>
+        <p:spPr/>
+        <p:txBody>
+          <a:bodyPr/>
+          <a:lstStyle/>
+          <a:p>
+            <a:endParaRPr lang="en-US" dirty="0"/>
+          </a:p>
+        </p:txBody>
+      </p:sp>
+      <p:sp>
+        <p:nvSpPr>
+          <p:cNvPr id="4" name="Slide Number Placeholder 3"/>
+          <p:cNvSpPr>
+            <a:spLocks noGrp="1"/>
+          </p:cNvSpPr>
+          <p:nvPr>
+            <p:ph type="sldNum" sz="quarter" idx="5"/>
+          </p:nvPr>
+        </p:nvSpPr>
+        <p:spPr/>
+        <p:txBody>
+          <a:bodyPr/>
+          <a:lstStyle/>
+          <a:p>
+            <a:pPr>
+              <a:defRPr/>
+            </a:pPr>
+            <a:fld id="{081A5F36-B61F-49EC-A0D1-BD4BBE826C8E}" type="slidenum">
+              <a:rPr lang="en-US" smtClean="0"/>
+              <a:pPr>
+                <a:defRPr/>
+              </a:pPr>
+              <a:t>4</a:t>
+            </a:fld>
+            <a:endParaRPr lang="en-US" dirty="0"/>
+          </a:p>
+        </p:txBody>
+      </p:sp>
+    </p:spTree>
+    <p:extLst>
+      <p:ext uri="{BB962C8B-B14F-4D97-AF65-F5344CB8AC3E}">
+        <p14:creationId xmlns:p14="http://schemas.microsoft.com/office/powerpoint/2010/main" val="3753354315"/>
+      </p:ext>
+    </p:extLst>
+  </p:cSld>
+  <p:clrMapOvr>
+    <a:masterClrMapping/>
+  </p:clrMapOvr>
+</p:notes>
+</file>
+
 <file path=ppt/slideLayouts/slideLayout1.xml><?xml version="1.0" encoding="utf-8"?>
 <p:sldLayout xmlns:a="http://schemas.openxmlformats.org/drawingml/2006/main" xmlns:r="http://schemas.openxmlformats.org/officeDocument/2006/relationships" xmlns:p="http://schemas.openxmlformats.org/presentationml/2006/main" type="title" preserve="1">
   <p:cSld name="Title Slide">
@@ -1017,7 +1107,7 @@
             </a:pPr>
             <a:r>
               <a:rPr lang="en-US"/>
-              <a:t>July 11, 2016</a:t>
+              <a:t>Dec. 2019</a:t>
             </a:r>
             <a:endParaRPr lang="en-US" dirty="0"/>
           </a:p>
@@ -1047,7 +1137,7 @@
             </a:pPr>
             <a:r>
               <a:rPr lang="en-US"/>
-              <a:t>23rd International Congress on Sound &amp; Vibration</a:t>
+              <a:t>LaTeX Seminár</a:t>
             </a:r>
             <a:endParaRPr lang="en-US" dirty="0"/>
           </a:p>
@@ -1468,7 +1558,7 @@
             </a:pPr>
             <a:r>
               <a:rPr lang="en-US"/>
-              <a:t>July 11, 2016</a:t>
+              <a:t>Dec. 2019</a:t>
             </a:r>
             <a:endParaRPr lang="en-US" dirty="0"/>
           </a:p>
@@ -1500,7 +1590,7 @@
             </a:pPr>
             <a:r>
               <a:rPr lang="en-US"/>
-              <a:t>23rd International Congress on Sound &amp; Vibration</a:t>
+              <a:t>LaTeX Seminár</a:t>
             </a:r>
             <a:endParaRPr lang="en-US" dirty="0"/>
           </a:p>
@@ -1805,7 +1895,7 @@
             </a:pPr>
             <a:r>
               <a:rPr lang="en-US"/>
-              <a:t>July 11, 2016</a:t>
+              <a:t>Dec. 2019</a:t>
             </a:r>
             <a:endParaRPr lang="en-US" dirty="0"/>
           </a:p>
@@ -1837,7 +1927,7 @@
             </a:pPr>
             <a:r>
               <a:rPr lang="en-US"/>
-              <a:t>23rd International Congress on Sound &amp; Vibration</a:t>
+              <a:t>LaTeX Seminár</a:t>
             </a:r>
             <a:endParaRPr lang="en-US" dirty="0"/>
           </a:p>
@@ -2104,7 +2194,7 @@
             </a:pPr>
             <a:r>
               <a:rPr lang="en-US"/>
-              <a:t>July 11, 2016</a:t>
+              <a:t>Dec. 2019</a:t>
             </a:r>
             <a:endParaRPr lang="en-US" dirty="0"/>
           </a:p>
@@ -2136,7 +2226,7 @@
             </a:pPr>
             <a:r>
               <a:rPr lang="en-US"/>
-              <a:t>23rd International Congress on Sound &amp; Vibration</a:t>
+              <a:t>LaTeX Seminár</a:t>
             </a:r>
             <a:endParaRPr lang="en-US" dirty="0"/>
           </a:p>
@@ -2408,7 +2498,7 @@
             </a:pPr>
             <a:r>
               <a:rPr lang="en-US"/>
-              <a:t>July 11, 2016</a:t>
+              <a:t>Dec. 2019</a:t>
             </a:r>
             <a:endParaRPr lang="en-US" dirty="0"/>
           </a:p>
@@ -2440,7 +2530,7 @@
             </a:pPr>
             <a:r>
               <a:rPr lang="en-US"/>
-              <a:t>23rd International Congress on Sound &amp; Vibration</a:t>
+              <a:t>LaTeX Seminár</a:t>
             </a:r>
             <a:endParaRPr lang="en-US" dirty="0"/>
           </a:p>
@@ -2712,7 +2802,7 @@
             </a:pPr>
             <a:r>
               <a:rPr lang="en-US"/>
-              <a:t>July 11, 2016</a:t>
+              <a:t>Dec. 2019</a:t>
             </a:r>
             <a:endParaRPr lang="en-US" dirty="0"/>
           </a:p>
@@ -2748,7 +2838,7 @@
             </a:pPr>
             <a:r>
               <a:rPr lang="en-US" b="1"/>
-              <a:t>23rd International Congress on Sound &amp; Vibration</a:t>
+              <a:t>LaTeX Seminár</a:t>
             </a:r>
             <a:endParaRPr lang="en-US" dirty="0"/>
           </a:p>
@@ -2974,7 +3064,7 @@
             </a:pPr>
             <a:r>
               <a:rPr lang="en-US"/>
-              <a:t>July 11, 2016</a:t>
+              <a:t>Dec. 2019</a:t>
             </a:r>
             <a:endParaRPr lang="en-US" dirty="0"/>
           </a:p>
@@ -3006,7 +3096,7 @@
             </a:pPr>
             <a:r>
               <a:rPr lang="en-US"/>
-              <a:t>23rd International Congress on Sound &amp; Vibration</a:t>
+              <a:t>LaTeX Seminár</a:t>
             </a:r>
             <a:endParaRPr lang="en-US" dirty="0"/>
           </a:p>
@@ -3273,7 +3363,7 @@
             </a:pPr>
             <a:r>
               <a:rPr lang="en-US"/>
-              <a:t>July 11, 2016</a:t>
+              <a:t>Dec. 2019</a:t>
             </a:r>
             <a:endParaRPr lang="en-US" dirty="0"/>
           </a:p>
@@ -3305,7 +3395,7 @@
             </a:pPr>
             <a:r>
               <a:rPr lang="en-US"/>
-              <a:t>23rd International Congress on Sound &amp; Vibration</a:t>
+              <a:t>LaTeX Seminár</a:t>
             </a:r>
             <a:endParaRPr lang="en-US" dirty="0"/>
           </a:p>
@@ -3506,7 +3596,7 @@
             </a:pPr>
             <a:r>
               <a:rPr lang="en-US"/>
-              <a:t>July 11, 2016</a:t>
+              <a:t>Dec. 2019</a:t>
             </a:r>
             <a:endParaRPr lang="en-US" dirty="0"/>
           </a:p>
@@ -3538,7 +3628,7 @@
             </a:pPr>
             <a:r>
               <a:rPr lang="en-US"/>
-              <a:t>23rd International Congress on Sound &amp; Vibration</a:t>
+              <a:t>LaTeX Seminár</a:t>
             </a:r>
             <a:endParaRPr lang="en-US" dirty="0"/>
           </a:p>
@@ -3873,7 +3963,7 @@
             </a:pPr>
             <a:r>
               <a:rPr lang="en-US"/>
-              <a:t>July 11, 2016</a:t>
+              <a:t>Dec. 2019</a:t>
             </a:r>
             <a:endParaRPr lang="en-US" dirty="0"/>
           </a:p>
@@ -3905,7 +3995,7 @@
             </a:pPr>
             <a:r>
               <a:rPr lang="en-US"/>
-              <a:t>23rd International Congress on Sound &amp; Vibration</a:t>
+              <a:t>LaTeX Seminár</a:t>
             </a:r>
             <a:endParaRPr lang="en-US" dirty="0"/>
           </a:p>
@@ -4383,7 +4473,7 @@
             </a:pPr>
             <a:r>
               <a:rPr lang="en-US"/>
-              <a:t>July 11, 2016</a:t>
+              <a:t>Dec. 2019</a:t>
             </a:r>
             <a:endParaRPr lang="en-US" dirty="0"/>
           </a:p>
@@ -4415,7 +4505,7 @@
             </a:pPr>
             <a:r>
               <a:rPr lang="en-US"/>
-              <a:t>23rd International Congress on Sound &amp; Vibration</a:t>
+              <a:t>LaTeX Seminár</a:t>
             </a:r>
             <a:endParaRPr lang="en-US" dirty="0"/>
           </a:p>
@@ -4542,7 +4632,7 @@
             </a:pPr>
             <a:r>
               <a:rPr lang="en-US"/>
-              <a:t>July 11, 2016</a:t>
+              <a:t>Dec. 2019</a:t>
             </a:r>
             <a:endParaRPr lang="en-US" dirty="0"/>
           </a:p>
@@ -4574,7 +4664,7 @@
             </a:pPr>
             <a:r>
               <a:rPr lang="en-US"/>
-              <a:t>23rd International Congress on Sound &amp; Vibration</a:t>
+              <a:t>LaTeX Seminár</a:t>
             </a:r>
             <a:endParaRPr lang="en-US" dirty="0"/>
           </a:p>
@@ -5344,7 +5434,7 @@
             </a:pPr>
             <a:r>
               <a:rPr lang="en-US"/>
-              <a:t>July 11, 2016</a:t>
+              <a:t>Dec. 2019</a:t>
             </a:r>
             <a:endParaRPr lang="en-US" dirty="0"/>
           </a:p>
@@ -5399,7 +5489,7 @@
             </a:pPr>
             <a:r>
               <a:rPr lang="en-US"/>
-              <a:t>23rd International Congress on Sound &amp; Vibration</a:t>
+              <a:t>LaTeX Seminár</a:t>
             </a:r>
             <a:endParaRPr lang="en-US" dirty="0"/>
           </a:p>
@@ -5929,8 +6019,17 @@
           <a:p>
             <a:r>
               <a:rPr lang="en-US" dirty="0"/>
-              <a:t>LaTeX</a:t>
-            </a:r>
+              <a:t>LaTeX </a:t>
+            </a:r>
+            <a:r>
+              <a:rPr lang="en-US" dirty="0" err="1"/>
+              <a:t>Semin</a:t>
+            </a:r>
+            <a:r>
+              <a:rPr lang="hu-HU" dirty="0"/>
+              <a:t>ár</a:t>
+            </a:r>
+            <a:endParaRPr lang="en-US" dirty="0"/>
           </a:p>
         </p:txBody>
       </p:sp>
@@ -6128,7 +6227,7 @@
             </a:pPr>
             <a:r>
               <a:rPr lang="en-US"/>
-              <a:t>July 11, 2016</a:t>
+              <a:t>Dec. 2019</a:t>
             </a:r>
             <a:endParaRPr lang="en-US" dirty="0"/>
           </a:p>
@@ -6154,7 +6253,7 @@
             </a:pPr>
             <a:r>
               <a:rPr lang="en-US"/>
-              <a:t>23rd International Congress on Sound &amp; Vibration</a:t>
+              <a:t>LaTeX Seminár</a:t>
             </a:r>
             <a:endParaRPr lang="en-US" dirty="0"/>
           </a:p>
@@ -6530,7 +6629,7 @@
             </a:pPr>
             <a:r>
               <a:rPr lang="en-US"/>
-              <a:t>July 11, 2016</a:t>
+              <a:t>Dec. 2019</a:t>
             </a:r>
             <a:endParaRPr lang="en-US" dirty="0"/>
           </a:p>
@@ -6556,7 +6655,7 @@
             </a:pPr>
             <a:r>
               <a:rPr lang="en-US"/>
-              <a:t>23rd International Congress on Sound &amp; Vibration</a:t>
+              <a:t>LaTeX Seminár</a:t>
             </a:r>
             <a:endParaRPr lang="en-US" dirty="0"/>
           </a:p>
@@ -6691,8 +6790,16 @@
           <a:lstStyle/>
           <a:p>
             <a:r>
+              <a:rPr lang="en-US" dirty="0" err="1"/>
+              <a:t>Pozn</a:t>
+            </a:r>
+            <a:r>
+              <a:rPr lang="sk-SK" dirty="0" err="1"/>
+              <a:t>ámky</a:t>
+            </a:r>
+            <a:r>
               <a:rPr lang="sk-SK" dirty="0"/>
-              <a:t>Štruktúra dokumentu</a:t>
+              <a:t> pod čiarou</a:t>
             </a:r>
             <a:endParaRPr lang="en-US" dirty="0"/>
           </a:p>
@@ -6711,7 +6818,7 @@
         <p:spPr/>
         <p:txBody>
           <a:bodyPr>
-            <a:normAutofit lnSpcReduction="10000"/>
+            <a:normAutofit/>
           </a:bodyPr>
           <a:lstStyle/>
           <a:p>
@@ -6722,277 +6829,144 @@
               <a:rPr lang="sk-SK" b="1" dirty="0">
                 <a:cs typeface="Courier New" panose="02070309020205020404" pitchFamily="49" charset="0"/>
               </a:rPr>
-              <a:t>Kapitola:</a:t>
-            </a:r>
-          </a:p>
-          <a:p>
-            <a:pPr marL="0" indent="0">
-              <a:buNone/>
-            </a:pPr>
+              <a:t>LaTeX automaticky očísluje poznámky pod čiarou:</a:t>
+            </a:r>
+          </a:p>
+          <a:p>
+            <a:pPr marL="0" indent="0">
+              <a:buNone/>
+            </a:pPr>
+            <a:r>
+              <a:rPr lang="en-US" dirty="0" err="1">
+                <a:latin typeface="Courier New" panose="02070309020205020404" pitchFamily="49" charset="0"/>
+                <a:cs typeface="Courier New" panose="02070309020205020404" pitchFamily="49" charset="0"/>
+              </a:rPr>
+              <a:t>Sed</a:t>
+            </a:r>
             <a:r>
               <a:rPr lang="en-US" dirty="0">
                 <a:latin typeface="Courier New" panose="02070309020205020404" pitchFamily="49" charset="0"/>
                 <a:cs typeface="Courier New" panose="02070309020205020404" pitchFamily="49" charset="0"/>
               </a:rPr>
-              <a:t>\chapter{</a:t>
-            </a:r>
-            <a:r>
-              <a:rPr lang="sk-SK" dirty="0" err="1">
-                <a:latin typeface="Courier New" panose="02070309020205020404" pitchFamily="49" charset="0"/>
-                <a:cs typeface="Courier New" panose="02070309020205020404" pitchFamily="49" charset="0"/>
-              </a:rPr>
-              <a:t>Nazov</a:t>
+              <a:t> </a:t>
+            </a:r>
+            <a:r>
+              <a:rPr lang="en-US" dirty="0" err="1">
+                <a:latin typeface="Courier New" panose="02070309020205020404" pitchFamily="49" charset="0"/>
+                <a:cs typeface="Courier New" panose="02070309020205020404" pitchFamily="49" charset="0"/>
+              </a:rPr>
+              <a:t>pretium</a:t>
             </a:r>
             <a:r>
               <a:rPr lang="en-US" dirty="0">
                 <a:latin typeface="Courier New" panose="02070309020205020404" pitchFamily="49" charset="0"/>
                 <a:cs typeface="Courier New" panose="02070309020205020404" pitchFamily="49" charset="0"/>
               </a:rPr>
-              <a:t>}</a:t>
-            </a:r>
-          </a:p>
-          <a:p>
-            <a:pPr marL="0" indent="0">
-              <a:buNone/>
-            </a:pPr>
+              <a:t> </a:t>
+            </a:r>
+            <a:r>
+              <a:rPr lang="en-US" dirty="0" err="1">
+                <a:latin typeface="Courier New" panose="02070309020205020404" pitchFamily="49" charset="0"/>
+                <a:cs typeface="Courier New" panose="02070309020205020404" pitchFamily="49" charset="0"/>
+              </a:rPr>
+              <a:t>ultrices</a:t>
+            </a:r>
             <a:r>
               <a:rPr lang="en-US" dirty="0">
                 <a:latin typeface="Courier New" panose="02070309020205020404" pitchFamily="49" charset="0"/>
                 <a:cs typeface="Courier New" panose="02070309020205020404" pitchFamily="49" charset="0"/>
               </a:rPr>
-              <a:t>Text</a:t>
-            </a:r>
-            <a:r>
-              <a:rPr lang="sk-SK" dirty="0">
-                <a:latin typeface="Courier New" panose="02070309020205020404" pitchFamily="49" charset="0"/>
-                <a:cs typeface="Courier New" panose="02070309020205020404" pitchFamily="49" charset="0"/>
-              </a:rPr>
-              <a:t>...</a:t>
-            </a:r>
-            <a:endParaRPr lang="en-US" dirty="0">
+              <a:t> </a:t>
+            </a:r>
+            <a:r>
+              <a:rPr lang="en-US" dirty="0" err="1">
+                <a:latin typeface="Courier New" panose="02070309020205020404" pitchFamily="49" charset="0"/>
+                <a:cs typeface="Courier New" panose="02070309020205020404" pitchFamily="49" charset="0"/>
+              </a:rPr>
+              <a:t>velit</a:t>
+            </a:r>
+            <a:r>
+              <a:rPr lang="en-US" dirty="0">
+                <a:latin typeface="Courier New" panose="02070309020205020404" pitchFamily="49" charset="0"/>
+                <a:cs typeface="Courier New" panose="02070309020205020404" pitchFamily="49" charset="0"/>
+              </a:rPr>
+              <a:t> </a:t>
+            </a:r>
+            <a:r>
+              <a:rPr lang="en-US" dirty="0" err="1">
+                <a:latin typeface="Courier New" panose="02070309020205020404" pitchFamily="49" charset="0"/>
+                <a:cs typeface="Courier New" panose="02070309020205020404" pitchFamily="49" charset="0"/>
+              </a:rPr>
+              <a:t>quis</a:t>
+            </a:r>
+            <a:r>
+              <a:rPr lang="en-US" dirty="0">
+                <a:latin typeface="Courier New" panose="02070309020205020404" pitchFamily="49" charset="0"/>
+                <a:cs typeface="Courier New" panose="02070309020205020404" pitchFamily="49" charset="0"/>
+              </a:rPr>
+              <a:t> </a:t>
+            </a:r>
+            <a:r>
+              <a:rPr lang="en-US" dirty="0" err="1">
+                <a:latin typeface="Courier New" panose="02070309020205020404" pitchFamily="49" charset="0"/>
+                <a:cs typeface="Courier New" panose="02070309020205020404" pitchFamily="49" charset="0"/>
+              </a:rPr>
+              <a:t>vulputate</a:t>
+            </a:r>
+            <a:r>
+              <a:rPr lang="en-US" dirty="0">
+                <a:latin typeface="Courier New" panose="02070309020205020404" pitchFamily="49" charset="0"/>
+                <a:cs typeface="Courier New" panose="02070309020205020404" pitchFamily="49" charset="0"/>
+              </a:rPr>
+              <a:t>\footnote{Toto je </a:t>
+            </a:r>
+            <a:r>
+              <a:rPr lang="en-US" dirty="0" err="1">
+                <a:latin typeface="Courier New" panose="02070309020205020404" pitchFamily="49" charset="0"/>
+                <a:cs typeface="Courier New" panose="02070309020205020404" pitchFamily="49" charset="0"/>
+              </a:rPr>
+              <a:t>nezname</a:t>
+            </a:r>
+            <a:r>
+              <a:rPr lang="en-US" dirty="0">
+                <a:latin typeface="Courier New" panose="02070309020205020404" pitchFamily="49" charset="0"/>
+                <a:cs typeface="Courier New" panose="02070309020205020404" pitchFamily="49" charset="0"/>
+              </a:rPr>
+              <a:t> </a:t>
+            </a:r>
+            <a:r>
+              <a:rPr lang="en-US" dirty="0" err="1">
+                <a:latin typeface="Courier New" panose="02070309020205020404" pitchFamily="49" charset="0"/>
+                <a:cs typeface="Courier New" panose="02070309020205020404" pitchFamily="49" charset="0"/>
+              </a:rPr>
+              <a:t>latinske</a:t>
+            </a:r>
+            <a:r>
+              <a:rPr lang="en-US" dirty="0">
+                <a:latin typeface="Courier New" panose="02070309020205020404" pitchFamily="49" charset="0"/>
+                <a:cs typeface="Courier New" panose="02070309020205020404" pitchFamily="49" charset="0"/>
+              </a:rPr>
+              <a:t> </a:t>
+            </a:r>
+            <a:r>
+              <a:rPr lang="en-US" dirty="0" err="1">
+                <a:latin typeface="Courier New" panose="02070309020205020404" pitchFamily="49" charset="0"/>
+                <a:cs typeface="Courier New" panose="02070309020205020404" pitchFamily="49" charset="0"/>
+              </a:rPr>
+              <a:t>slovo</a:t>
+            </a:r>
+            <a:r>
+              <a:rPr lang="en-US" dirty="0">
+                <a:latin typeface="Courier New" panose="02070309020205020404" pitchFamily="49" charset="0"/>
+                <a:cs typeface="Courier New" panose="02070309020205020404" pitchFamily="49" charset="0"/>
+              </a:rPr>
+              <a:t>}. </a:t>
+            </a:r>
+            <a:endParaRPr lang="sk-SK" dirty="0">
               <a:latin typeface="Courier New" panose="02070309020205020404" pitchFamily="49" charset="0"/>
               <a:cs typeface="Courier New" panose="02070309020205020404" pitchFamily="49" charset="0"/>
             </a:endParaRPr>
           </a:p>
-          <a:p>
-            <a:pPr marL="0" indent="0">
-              <a:buNone/>
-            </a:pPr>
-            <a:r>
-              <a:rPr lang="sk-SK" b="1" dirty="0">
-                <a:cs typeface="Courier New" panose="02070309020205020404" pitchFamily="49" charset="0"/>
-              </a:rPr>
-              <a:t>Podkapitola </a:t>
-            </a:r>
-            <a:r>
-              <a:rPr lang="hu-HU" b="1" dirty="0">
-                <a:cs typeface="Courier New" panose="02070309020205020404" pitchFamily="49" charset="0"/>
-              </a:rPr>
-              <a:t>(</a:t>
-            </a:r>
-            <a:r>
-              <a:rPr lang="hu-HU" b="1" dirty="0" err="1">
-                <a:cs typeface="Courier New" panose="02070309020205020404" pitchFamily="49" charset="0"/>
-              </a:rPr>
-              <a:t>sekcia</a:t>
-            </a:r>
-            <a:r>
-              <a:rPr lang="hu-HU" b="1" dirty="0">
-                <a:cs typeface="Courier New" panose="02070309020205020404" pitchFamily="49" charset="0"/>
-              </a:rPr>
-              <a:t>):</a:t>
-            </a:r>
-            <a:endParaRPr lang="en-US" b="1" dirty="0">
-              <a:cs typeface="Courier New" panose="02070309020205020404" pitchFamily="49" charset="0"/>
-            </a:endParaRPr>
-          </a:p>
-          <a:p>
-            <a:pPr marL="0" indent="0">
-              <a:buNone/>
-            </a:pPr>
-            <a:r>
-              <a:rPr lang="en-US" dirty="0">
-                <a:latin typeface="Courier New" panose="02070309020205020404" pitchFamily="49" charset="0"/>
-                <a:cs typeface="Courier New" panose="02070309020205020404" pitchFamily="49" charset="0"/>
-              </a:rPr>
-              <a:t>\section{</a:t>
-            </a:r>
-            <a:r>
-              <a:rPr lang="sk-SK" dirty="0" err="1">
-                <a:latin typeface="Courier New" panose="02070309020205020404" pitchFamily="49" charset="0"/>
-                <a:cs typeface="Courier New" panose="02070309020205020404" pitchFamily="49" charset="0"/>
-              </a:rPr>
-              <a:t>Nazov</a:t>
-            </a:r>
-            <a:r>
-              <a:rPr lang="en-US" dirty="0">
-                <a:latin typeface="Courier New" panose="02070309020205020404" pitchFamily="49" charset="0"/>
-                <a:cs typeface="Courier New" panose="02070309020205020404" pitchFamily="49" charset="0"/>
-              </a:rPr>
-              <a:t>}</a:t>
-            </a:r>
-          </a:p>
-          <a:p>
-            <a:pPr marL="0" indent="0">
-              <a:buNone/>
-            </a:pPr>
-            <a:r>
-              <a:rPr lang="en-US" dirty="0">
-                <a:latin typeface="Courier New" panose="02070309020205020404" pitchFamily="49" charset="0"/>
-                <a:cs typeface="Courier New" panose="02070309020205020404" pitchFamily="49" charset="0"/>
-              </a:rPr>
-              <a:t>Text</a:t>
-            </a:r>
-            <a:r>
-              <a:rPr lang="sk-SK" dirty="0">
-                <a:latin typeface="Courier New" panose="02070309020205020404" pitchFamily="49" charset="0"/>
-                <a:cs typeface="Courier New" panose="02070309020205020404" pitchFamily="49" charset="0"/>
-              </a:rPr>
-              <a:t>...</a:t>
-            </a:r>
-            <a:endParaRPr lang="en-US" dirty="0">
-              <a:latin typeface="Courier New" panose="02070309020205020404" pitchFamily="49" charset="0"/>
-              <a:cs typeface="Courier New" panose="02070309020205020404" pitchFamily="49" charset="0"/>
-            </a:endParaRPr>
-          </a:p>
-          <a:p>
-            <a:pPr marL="0" indent="0">
-              <a:buNone/>
-            </a:pPr>
-            <a:r>
-              <a:rPr lang="sk-SK" b="1" dirty="0" err="1">
-                <a:cs typeface="Courier New" panose="02070309020205020404" pitchFamily="49" charset="0"/>
-              </a:rPr>
-              <a:t>Pod-podkapitola</a:t>
-            </a:r>
-            <a:r>
-              <a:rPr lang="sk-SK" b="1" dirty="0">
-                <a:cs typeface="Courier New" panose="02070309020205020404" pitchFamily="49" charset="0"/>
-              </a:rPr>
-              <a:t>:</a:t>
-            </a:r>
-            <a:endParaRPr lang="en-US" b="1" dirty="0">
-              <a:cs typeface="Courier New" panose="02070309020205020404" pitchFamily="49" charset="0"/>
-            </a:endParaRPr>
-          </a:p>
-          <a:p>
-            <a:pPr marL="0" indent="0">
-              <a:buNone/>
-            </a:pPr>
-            <a:r>
-              <a:rPr lang="en-US" dirty="0">
-                <a:latin typeface="Courier New" panose="02070309020205020404" pitchFamily="49" charset="0"/>
-                <a:cs typeface="Courier New" panose="02070309020205020404" pitchFamily="49" charset="0"/>
-              </a:rPr>
-              <a:t>\subsection{</a:t>
-            </a:r>
-            <a:r>
-              <a:rPr lang="sk-SK" dirty="0" err="1">
-                <a:latin typeface="Courier New" panose="02070309020205020404" pitchFamily="49" charset="0"/>
-                <a:cs typeface="Courier New" panose="02070309020205020404" pitchFamily="49" charset="0"/>
-              </a:rPr>
-              <a:t>Nazov</a:t>
-            </a:r>
-            <a:r>
-              <a:rPr lang="en-US" dirty="0">
-                <a:latin typeface="Courier New" panose="02070309020205020404" pitchFamily="49" charset="0"/>
-                <a:cs typeface="Courier New" panose="02070309020205020404" pitchFamily="49" charset="0"/>
-              </a:rPr>
-              <a:t>}</a:t>
-            </a:r>
-          </a:p>
-          <a:p>
-            <a:pPr marL="0" indent="0">
-              <a:buNone/>
-            </a:pPr>
-            <a:r>
-              <a:rPr lang="en-US" dirty="0">
-                <a:latin typeface="Courier New" panose="02070309020205020404" pitchFamily="49" charset="0"/>
-                <a:cs typeface="Courier New" panose="02070309020205020404" pitchFamily="49" charset="0"/>
-              </a:rPr>
-              <a:t>Text</a:t>
-            </a:r>
-            <a:r>
-              <a:rPr lang="sk-SK" dirty="0">
-                <a:latin typeface="Courier New" panose="02070309020205020404" pitchFamily="49" charset="0"/>
-                <a:cs typeface="Courier New" panose="02070309020205020404" pitchFamily="49" charset="0"/>
-              </a:rPr>
-              <a:t>...</a:t>
-            </a:r>
-            <a:endParaRPr lang="en-US" dirty="0">
-              <a:latin typeface="Courier New" panose="02070309020205020404" pitchFamily="49" charset="0"/>
-              <a:cs typeface="Courier New" panose="02070309020205020404" pitchFamily="49" charset="0"/>
-            </a:endParaRPr>
-          </a:p>
-          <a:p>
-            <a:pPr marL="0" indent="0">
-              <a:buNone/>
-            </a:pPr>
-            <a:r>
-              <a:rPr lang="sk-SK" b="1" dirty="0" err="1">
-                <a:cs typeface="Courier New" panose="02070309020205020404" pitchFamily="49" charset="0"/>
-              </a:rPr>
-              <a:t>Pod-pod-podkapitola</a:t>
-            </a:r>
-            <a:r>
-              <a:rPr lang="sk-SK" b="1" dirty="0">
-                <a:cs typeface="Courier New" panose="02070309020205020404" pitchFamily="49" charset="0"/>
-              </a:rPr>
-              <a:t>:</a:t>
-            </a:r>
-            <a:endParaRPr lang="en-US" b="1" dirty="0">
-              <a:cs typeface="Courier New" panose="02070309020205020404" pitchFamily="49" charset="0"/>
-            </a:endParaRPr>
-          </a:p>
-          <a:p>
-            <a:pPr marL="0" indent="0">
-              <a:buNone/>
-            </a:pPr>
-            <a:r>
-              <a:rPr lang="en-US" dirty="0">
-                <a:latin typeface="Courier New" panose="02070309020205020404" pitchFamily="49" charset="0"/>
-                <a:cs typeface="Courier New" panose="02070309020205020404" pitchFamily="49" charset="0"/>
-              </a:rPr>
-              <a:t>\subsubsection{</a:t>
-            </a:r>
-            <a:r>
-              <a:rPr lang="sk-SK" dirty="0" err="1">
-                <a:latin typeface="Courier New" panose="02070309020205020404" pitchFamily="49" charset="0"/>
-                <a:cs typeface="Courier New" panose="02070309020205020404" pitchFamily="49" charset="0"/>
-              </a:rPr>
-              <a:t>Nazov</a:t>
-            </a:r>
-            <a:r>
-              <a:rPr lang="en-US" dirty="0">
-                <a:latin typeface="Courier New" panose="02070309020205020404" pitchFamily="49" charset="0"/>
-                <a:cs typeface="Courier New" panose="02070309020205020404" pitchFamily="49" charset="0"/>
-              </a:rPr>
-              <a:t>}</a:t>
-            </a:r>
-          </a:p>
-          <a:p>
-            <a:pPr marL="0" indent="0">
-              <a:buNone/>
-            </a:pPr>
-            <a:r>
-              <a:rPr lang="en-US" dirty="0">
-                <a:latin typeface="Courier New" panose="02070309020205020404" pitchFamily="49" charset="0"/>
-                <a:cs typeface="Courier New" panose="02070309020205020404" pitchFamily="49" charset="0"/>
-              </a:rPr>
-              <a:t>Text</a:t>
-            </a:r>
-            <a:r>
-              <a:rPr lang="sk-SK" dirty="0">
-                <a:latin typeface="Courier New" panose="02070309020205020404" pitchFamily="49" charset="0"/>
-                <a:cs typeface="Courier New" panose="02070309020205020404" pitchFamily="49" charset="0"/>
-              </a:rPr>
-              <a:t>...</a:t>
-            </a:r>
-            <a:endParaRPr lang="en-US" dirty="0">
-              <a:latin typeface="Courier New" panose="02070309020205020404" pitchFamily="49" charset="0"/>
-              <a:cs typeface="Courier New" panose="02070309020205020404" pitchFamily="49" charset="0"/>
-            </a:endParaRPr>
-          </a:p>
         </p:txBody>
       </p:sp>
       <p:sp>
@@ -7015,7 +6989,7 @@
             </a:pPr>
             <a:r>
               <a:rPr lang="en-US"/>
-              <a:t>July 11, 2016</a:t>
+              <a:t>Dec. 2019</a:t>
             </a:r>
             <a:endParaRPr lang="en-US" dirty="0"/>
           </a:p>
@@ -7041,7 +7015,7 @@
             </a:pPr>
             <a:r>
               <a:rPr lang="en-US"/>
-              <a:t>23rd International Congress on Sound &amp; Vibration</a:t>
+              <a:t>LaTeX Seminár</a:t>
             </a:r>
             <a:endParaRPr lang="en-US" dirty="0"/>
           </a:p>
@@ -7071,312 +7045,6 @@
                 <a:defRPr/>
               </a:pPr>
               <a:t>12</a:t>
-            </a:fld>
-            <a:endParaRPr lang="en-US" dirty="0"/>
-          </a:p>
-        </p:txBody>
-      </p:sp>
-    </p:spTree>
-    <p:extLst>
-      <p:ext uri="{BB962C8B-B14F-4D97-AF65-F5344CB8AC3E}">
-        <p14:creationId xmlns:p14="http://schemas.microsoft.com/office/powerpoint/2010/main" val="4281868456"/>
-      </p:ext>
-    </p:extLst>
-  </p:cSld>
-  <p:clrMapOvr>
-    <a:masterClrMapping/>
-  </p:clrMapOvr>
-</p:sld>
-</file>
-
-<file path=ppt/slides/slide13.xml><?xml version="1.0" encoding="utf-8"?>
-<p:sld xmlns:a="http://schemas.openxmlformats.org/drawingml/2006/main" xmlns:r="http://schemas.openxmlformats.org/officeDocument/2006/relationships" xmlns:p="http://schemas.openxmlformats.org/presentationml/2006/main">
-  <p:cSld>
-    <p:spTree>
-      <p:nvGrpSpPr>
-        <p:cNvPr id="1" name=""/>
-        <p:cNvGrpSpPr/>
-        <p:nvPr/>
-      </p:nvGrpSpPr>
-      <p:grpSpPr>
-        <a:xfrm>
-          <a:off x="0" y="0"/>
-          <a:ext cx="0" cy="0"/>
-          <a:chOff x="0" y="0"/>
-          <a:chExt cx="0" cy="0"/>
-        </a:xfrm>
-      </p:grpSpPr>
-      <p:sp>
-        <p:nvSpPr>
-          <p:cNvPr id="2" name="Title 1"/>
-          <p:cNvSpPr>
-            <a:spLocks noGrp="1"/>
-          </p:cNvSpPr>
-          <p:nvPr>
-            <p:ph type="title"/>
-          </p:nvPr>
-        </p:nvSpPr>
-        <p:spPr/>
-        <p:txBody>
-          <a:bodyPr/>
-          <a:lstStyle/>
-          <a:p>
-            <a:r>
-              <a:rPr lang="en-US" dirty="0" err="1"/>
-              <a:t>Pozn</a:t>
-            </a:r>
-            <a:r>
-              <a:rPr lang="sk-SK" dirty="0" err="1"/>
-              <a:t>ámky</a:t>
-            </a:r>
-            <a:r>
-              <a:rPr lang="sk-SK" dirty="0"/>
-              <a:t> pod čiarou</a:t>
-            </a:r>
-            <a:endParaRPr lang="en-US" dirty="0"/>
-          </a:p>
-        </p:txBody>
-      </p:sp>
-      <p:sp>
-        <p:nvSpPr>
-          <p:cNvPr id="3" name="Content Placeholder 2"/>
-          <p:cNvSpPr>
-            <a:spLocks noGrp="1"/>
-          </p:cNvSpPr>
-          <p:nvPr>
-            <p:ph idx="1"/>
-          </p:nvPr>
-        </p:nvSpPr>
-        <p:spPr/>
-        <p:txBody>
-          <a:bodyPr>
-            <a:normAutofit/>
-          </a:bodyPr>
-          <a:lstStyle/>
-          <a:p>
-            <a:pPr marL="0" indent="0">
-              <a:buNone/>
-            </a:pPr>
-            <a:r>
-              <a:rPr lang="sk-SK" b="1" dirty="0">
-                <a:cs typeface="Courier New" panose="02070309020205020404" pitchFamily="49" charset="0"/>
-              </a:rPr>
-              <a:t>LaTeX automaticky očísluje poznámky pod čiarou:</a:t>
-            </a:r>
-          </a:p>
-          <a:p>
-            <a:pPr marL="0" indent="0">
-              <a:buNone/>
-            </a:pPr>
-            <a:r>
-              <a:rPr lang="en-US" dirty="0" err="1">
-                <a:latin typeface="Courier New" panose="02070309020205020404" pitchFamily="49" charset="0"/>
-                <a:cs typeface="Courier New" panose="02070309020205020404" pitchFamily="49" charset="0"/>
-              </a:rPr>
-              <a:t>Sed</a:t>
-            </a:r>
-            <a:r>
-              <a:rPr lang="en-US" dirty="0">
-                <a:latin typeface="Courier New" panose="02070309020205020404" pitchFamily="49" charset="0"/>
-                <a:cs typeface="Courier New" panose="02070309020205020404" pitchFamily="49" charset="0"/>
-              </a:rPr>
-              <a:t> </a:t>
-            </a:r>
-            <a:r>
-              <a:rPr lang="en-US" dirty="0" err="1">
-                <a:latin typeface="Courier New" panose="02070309020205020404" pitchFamily="49" charset="0"/>
-                <a:cs typeface="Courier New" panose="02070309020205020404" pitchFamily="49" charset="0"/>
-              </a:rPr>
-              <a:t>pretium</a:t>
-            </a:r>
-            <a:r>
-              <a:rPr lang="en-US" dirty="0">
-                <a:latin typeface="Courier New" panose="02070309020205020404" pitchFamily="49" charset="0"/>
-                <a:cs typeface="Courier New" panose="02070309020205020404" pitchFamily="49" charset="0"/>
-              </a:rPr>
-              <a:t> </a:t>
-            </a:r>
-            <a:r>
-              <a:rPr lang="en-US" dirty="0" err="1">
-                <a:latin typeface="Courier New" panose="02070309020205020404" pitchFamily="49" charset="0"/>
-                <a:cs typeface="Courier New" panose="02070309020205020404" pitchFamily="49" charset="0"/>
-              </a:rPr>
-              <a:t>ultrices</a:t>
-            </a:r>
-            <a:r>
-              <a:rPr lang="en-US" dirty="0">
-                <a:latin typeface="Courier New" panose="02070309020205020404" pitchFamily="49" charset="0"/>
-                <a:cs typeface="Courier New" panose="02070309020205020404" pitchFamily="49" charset="0"/>
-              </a:rPr>
-              <a:t> </a:t>
-            </a:r>
-            <a:r>
-              <a:rPr lang="en-US" dirty="0" err="1">
-                <a:latin typeface="Courier New" panose="02070309020205020404" pitchFamily="49" charset="0"/>
-                <a:cs typeface="Courier New" panose="02070309020205020404" pitchFamily="49" charset="0"/>
-              </a:rPr>
-              <a:t>velit</a:t>
-            </a:r>
-            <a:r>
-              <a:rPr lang="en-US" dirty="0">
-                <a:latin typeface="Courier New" panose="02070309020205020404" pitchFamily="49" charset="0"/>
-                <a:cs typeface="Courier New" panose="02070309020205020404" pitchFamily="49" charset="0"/>
-              </a:rPr>
-              <a:t> </a:t>
-            </a:r>
-            <a:r>
-              <a:rPr lang="en-US" dirty="0" err="1">
-                <a:latin typeface="Courier New" panose="02070309020205020404" pitchFamily="49" charset="0"/>
-                <a:cs typeface="Courier New" panose="02070309020205020404" pitchFamily="49" charset="0"/>
-              </a:rPr>
-              <a:t>quis</a:t>
-            </a:r>
-            <a:r>
-              <a:rPr lang="en-US" dirty="0">
-                <a:latin typeface="Courier New" panose="02070309020205020404" pitchFamily="49" charset="0"/>
-                <a:cs typeface="Courier New" panose="02070309020205020404" pitchFamily="49" charset="0"/>
-              </a:rPr>
-              <a:t> </a:t>
-            </a:r>
-            <a:r>
-              <a:rPr lang="en-US" dirty="0" err="1">
-                <a:latin typeface="Courier New" panose="02070309020205020404" pitchFamily="49" charset="0"/>
-                <a:cs typeface="Courier New" panose="02070309020205020404" pitchFamily="49" charset="0"/>
-              </a:rPr>
-              <a:t>vulputate</a:t>
-            </a:r>
-            <a:r>
-              <a:rPr lang="en-US" dirty="0">
-                <a:latin typeface="Courier New" panose="02070309020205020404" pitchFamily="49" charset="0"/>
-                <a:cs typeface="Courier New" panose="02070309020205020404" pitchFamily="49" charset="0"/>
-              </a:rPr>
-              <a:t>\footnote{Toto je </a:t>
-            </a:r>
-            <a:r>
-              <a:rPr lang="en-US" dirty="0" err="1">
-                <a:latin typeface="Courier New" panose="02070309020205020404" pitchFamily="49" charset="0"/>
-                <a:cs typeface="Courier New" panose="02070309020205020404" pitchFamily="49" charset="0"/>
-              </a:rPr>
-              <a:t>nezname</a:t>
-            </a:r>
-            <a:r>
-              <a:rPr lang="en-US" dirty="0">
-                <a:latin typeface="Courier New" panose="02070309020205020404" pitchFamily="49" charset="0"/>
-                <a:cs typeface="Courier New" panose="02070309020205020404" pitchFamily="49" charset="0"/>
-              </a:rPr>
-              <a:t> </a:t>
-            </a:r>
-            <a:r>
-              <a:rPr lang="en-US" dirty="0" err="1">
-                <a:latin typeface="Courier New" panose="02070309020205020404" pitchFamily="49" charset="0"/>
-                <a:cs typeface="Courier New" panose="02070309020205020404" pitchFamily="49" charset="0"/>
-              </a:rPr>
-              <a:t>latinske</a:t>
-            </a:r>
-            <a:r>
-              <a:rPr lang="en-US" dirty="0">
-                <a:latin typeface="Courier New" panose="02070309020205020404" pitchFamily="49" charset="0"/>
-                <a:cs typeface="Courier New" panose="02070309020205020404" pitchFamily="49" charset="0"/>
-              </a:rPr>
-              <a:t> </a:t>
-            </a:r>
-            <a:r>
-              <a:rPr lang="en-US" dirty="0" err="1">
-                <a:latin typeface="Courier New" panose="02070309020205020404" pitchFamily="49" charset="0"/>
-                <a:cs typeface="Courier New" panose="02070309020205020404" pitchFamily="49" charset="0"/>
-              </a:rPr>
-              <a:t>slovo</a:t>
-            </a:r>
-            <a:r>
-              <a:rPr lang="en-US" dirty="0">
-                <a:latin typeface="Courier New" panose="02070309020205020404" pitchFamily="49" charset="0"/>
-                <a:cs typeface="Courier New" panose="02070309020205020404" pitchFamily="49" charset="0"/>
-              </a:rPr>
-              <a:t>}. </a:t>
-            </a:r>
-            <a:endParaRPr lang="sk-SK" dirty="0">
-              <a:latin typeface="Courier New" panose="02070309020205020404" pitchFamily="49" charset="0"/>
-              <a:cs typeface="Courier New" panose="02070309020205020404" pitchFamily="49" charset="0"/>
-            </a:endParaRPr>
-          </a:p>
-        </p:txBody>
-      </p:sp>
-      <p:sp>
-        <p:nvSpPr>
-          <p:cNvPr id="4" name="Date Placeholder 3"/>
-          <p:cNvSpPr>
-            <a:spLocks noGrp="1"/>
-          </p:cNvSpPr>
-          <p:nvPr>
-            <p:ph type="dt" sz="half" idx="10"/>
-          </p:nvPr>
-        </p:nvSpPr>
-        <p:spPr/>
-        <p:txBody>
-          <a:bodyPr/>
-          <a:lstStyle/>
-          <a:p>
-            <a:pPr>
-              <a:defRPr/>
-            </a:pPr>
-            <a:r>
-              <a:rPr lang="en-US"/>
-              <a:t>July 11, 2016</a:t>
-            </a:r>
-            <a:endParaRPr lang="en-US" dirty="0"/>
-          </a:p>
-        </p:txBody>
-      </p:sp>
-      <p:sp>
-        <p:nvSpPr>
-          <p:cNvPr id="5" name="Footer Placeholder 4"/>
-          <p:cNvSpPr>
-            <a:spLocks noGrp="1"/>
-          </p:cNvSpPr>
-          <p:nvPr>
-            <p:ph type="ftr" sz="quarter" idx="11"/>
-          </p:nvPr>
-        </p:nvSpPr>
-        <p:spPr/>
-        <p:txBody>
-          <a:bodyPr/>
-          <a:lstStyle/>
-          <a:p>
-            <a:pPr>
-              <a:defRPr/>
-            </a:pPr>
-            <a:r>
-              <a:rPr lang="en-US"/>
-              <a:t>23rd International Congress on Sound &amp; Vibration</a:t>
-            </a:r>
-            <a:endParaRPr lang="en-US" dirty="0"/>
-          </a:p>
-        </p:txBody>
-      </p:sp>
-      <p:sp>
-        <p:nvSpPr>
-          <p:cNvPr id="6" name="Slide Number Placeholder 5"/>
-          <p:cNvSpPr>
-            <a:spLocks noGrp="1"/>
-          </p:cNvSpPr>
-          <p:nvPr>
-            <p:ph type="sldNum" sz="quarter" idx="12"/>
-          </p:nvPr>
-        </p:nvSpPr>
-        <p:spPr/>
-        <p:txBody>
-          <a:bodyPr/>
-          <a:lstStyle/>
-          <a:p>
-            <a:pPr>
-              <a:defRPr/>
-            </a:pPr>
-            <a:fld id="{CB8C83D1-3F28-4854-B4AE-D4A71392F432}" type="slidenum">
-              <a:rPr lang="en-US" smtClean="0"/>
-              <a:pPr>
-                <a:defRPr/>
-              </a:pPr>
-              <a:t>13</a:t>
             </a:fld>
             <a:endParaRPr lang="en-US" dirty="0"/>
           </a:p>
@@ -7449,6 +7117,437 @@
 </p:sld>
 </file>
 
+<file path=ppt/slides/slide13.xml><?xml version="1.0" encoding="utf-8"?>
+<p:sld xmlns:a="http://schemas.openxmlformats.org/drawingml/2006/main" xmlns:r="http://schemas.openxmlformats.org/officeDocument/2006/relationships" xmlns:p="http://schemas.openxmlformats.org/presentationml/2006/main">
+  <p:cSld>
+    <p:spTree>
+      <p:nvGrpSpPr>
+        <p:cNvPr id="1" name=""/>
+        <p:cNvGrpSpPr/>
+        <p:nvPr/>
+      </p:nvGrpSpPr>
+      <p:grpSpPr>
+        <a:xfrm>
+          <a:off x="0" y="0"/>
+          <a:ext cx="0" cy="0"/>
+          <a:chOff x="0" y="0"/>
+          <a:chExt cx="0" cy="0"/>
+        </a:xfrm>
+      </p:grpSpPr>
+      <p:sp>
+        <p:nvSpPr>
+          <p:cNvPr id="2" name="Title 1"/>
+          <p:cNvSpPr>
+            <a:spLocks noGrp="1"/>
+          </p:cNvSpPr>
+          <p:nvPr>
+            <p:ph type="title"/>
+          </p:nvPr>
+        </p:nvSpPr>
+        <p:spPr/>
+        <p:txBody>
+          <a:bodyPr/>
+          <a:lstStyle/>
+          <a:p>
+            <a:r>
+              <a:rPr lang="sk-SK" dirty="0"/>
+              <a:t>Štruktúra dokumentu</a:t>
+            </a:r>
+            <a:endParaRPr lang="en-US" dirty="0"/>
+          </a:p>
+        </p:txBody>
+      </p:sp>
+      <p:sp>
+        <p:nvSpPr>
+          <p:cNvPr id="3" name="Content Placeholder 2"/>
+          <p:cNvSpPr>
+            <a:spLocks noGrp="1"/>
+          </p:cNvSpPr>
+          <p:nvPr>
+            <p:ph idx="1"/>
+          </p:nvPr>
+        </p:nvSpPr>
+        <p:spPr/>
+        <p:txBody>
+          <a:bodyPr>
+            <a:normAutofit lnSpcReduction="10000"/>
+          </a:bodyPr>
+          <a:lstStyle/>
+          <a:p>
+            <a:pPr marL="0" indent="0">
+              <a:buNone/>
+            </a:pPr>
+            <a:r>
+              <a:rPr lang="sk-SK" b="1" dirty="0">
+                <a:cs typeface="Courier New" panose="02070309020205020404" pitchFamily="49" charset="0"/>
+              </a:rPr>
+              <a:t>Kapitola:</a:t>
+            </a:r>
+          </a:p>
+          <a:p>
+            <a:pPr marL="0" indent="0">
+              <a:buNone/>
+            </a:pPr>
+            <a:r>
+              <a:rPr lang="en-US" dirty="0">
+                <a:latin typeface="Courier New" panose="02070309020205020404" pitchFamily="49" charset="0"/>
+                <a:cs typeface="Courier New" panose="02070309020205020404" pitchFamily="49" charset="0"/>
+              </a:rPr>
+              <a:t>\chapter{</a:t>
+            </a:r>
+            <a:r>
+              <a:rPr lang="sk-SK" dirty="0" err="1">
+                <a:latin typeface="Courier New" panose="02070309020205020404" pitchFamily="49" charset="0"/>
+                <a:cs typeface="Courier New" panose="02070309020205020404" pitchFamily="49" charset="0"/>
+              </a:rPr>
+              <a:t>Nazov</a:t>
+            </a:r>
+            <a:r>
+              <a:rPr lang="en-US" dirty="0">
+                <a:latin typeface="Courier New" panose="02070309020205020404" pitchFamily="49" charset="0"/>
+                <a:cs typeface="Courier New" panose="02070309020205020404" pitchFamily="49" charset="0"/>
+              </a:rPr>
+              <a:t>}</a:t>
+            </a:r>
+          </a:p>
+          <a:p>
+            <a:pPr marL="0" indent="0">
+              <a:buNone/>
+            </a:pPr>
+            <a:r>
+              <a:rPr lang="en-US" dirty="0">
+                <a:latin typeface="Courier New" panose="02070309020205020404" pitchFamily="49" charset="0"/>
+                <a:cs typeface="Courier New" panose="02070309020205020404" pitchFamily="49" charset="0"/>
+              </a:rPr>
+              <a:t>Text</a:t>
+            </a:r>
+            <a:r>
+              <a:rPr lang="sk-SK" dirty="0">
+                <a:latin typeface="Courier New" panose="02070309020205020404" pitchFamily="49" charset="0"/>
+                <a:cs typeface="Courier New" panose="02070309020205020404" pitchFamily="49" charset="0"/>
+              </a:rPr>
+              <a:t>...</a:t>
+            </a:r>
+            <a:endParaRPr lang="en-US" dirty="0">
+              <a:latin typeface="Courier New" panose="02070309020205020404" pitchFamily="49" charset="0"/>
+              <a:cs typeface="Courier New" panose="02070309020205020404" pitchFamily="49" charset="0"/>
+            </a:endParaRPr>
+          </a:p>
+          <a:p>
+            <a:pPr marL="0" indent="0">
+              <a:buNone/>
+            </a:pPr>
+            <a:r>
+              <a:rPr lang="sk-SK" b="1" dirty="0">
+                <a:cs typeface="Courier New" panose="02070309020205020404" pitchFamily="49" charset="0"/>
+              </a:rPr>
+              <a:t>Podkapitola </a:t>
+            </a:r>
+            <a:r>
+              <a:rPr lang="hu-HU" b="1" dirty="0">
+                <a:cs typeface="Courier New" panose="02070309020205020404" pitchFamily="49" charset="0"/>
+              </a:rPr>
+              <a:t>(</a:t>
+            </a:r>
+            <a:r>
+              <a:rPr lang="hu-HU" b="1" dirty="0" err="1">
+                <a:cs typeface="Courier New" panose="02070309020205020404" pitchFamily="49" charset="0"/>
+              </a:rPr>
+              <a:t>sekcia</a:t>
+            </a:r>
+            <a:r>
+              <a:rPr lang="hu-HU" b="1" dirty="0">
+                <a:cs typeface="Courier New" panose="02070309020205020404" pitchFamily="49" charset="0"/>
+              </a:rPr>
+              <a:t>):</a:t>
+            </a:r>
+            <a:endParaRPr lang="en-US" b="1" dirty="0">
+              <a:cs typeface="Courier New" panose="02070309020205020404" pitchFamily="49" charset="0"/>
+            </a:endParaRPr>
+          </a:p>
+          <a:p>
+            <a:pPr marL="0" indent="0">
+              <a:buNone/>
+            </a:pPr>
+            <a:r>
+              <a:rPr lang="en-US" dirty="0">
+                <a:latin typeface="Courier New" panose="02070309020205020404" pitchFamily="49" charset="0"/>
+                <a:cs typeface="Courier New" panose="02070309020205020404" pitchFamily="49" charset="0"/>
+              </a:rPr>
+              <a:t>\section{</a:t>
+            </a:r>
+            <a:r>
+              <a:rPr lang="sk-SK" dirty="0" err="1">
+                <a:latin typeface="Courier New" panose="02070309020205020404" pitchFamily="49" charset="0"/>
+                <a:cs typeface="Courier New" panose="02070309020205020404" pitchFamily="49" charset="0"/>
+              </a:rPr>
+              <a:t>Nazov</a:t>
+            </a:r>
+            <a:r>
+              <a:rPr lang="en-US" dirty="0">
+                <a:latin typeface="Courier New" panose="02070309020205020404" pitchFamily="49" charset="0"/>
+                <a:cs typeface="Courier New" panose="02070309020205020404" pitchFamily="49" charset="0"/>
+              </a:rPr>
+              <a:t>}</a:t>
+            </a:r>
+          </a:p>
+          <a:p>
+            <a:pPr marL="0" indent="0">
+              <a:buNone/>
+            </a:pPr>
+            <a:r>
+              <a:rPr lang="en-US" dirty="0">
+                <a:latin typeface="Courier New" panose="02070309020205020404" pitchFamily="49" charset="0"/>
+                <a:cs typeface="Courier New" panose="02070309020205020404" pitchFamily="49" charset="0"/>
+              </a:rPr>
+              <a:t>Text</a:t>
+            </a:r>
+            <a:r>
+              <a:rPr lang="sk-SK" dirty="0">
+                <a:latin typeface="Courier New" panose="02070309020205020404" pitchFamily="49" charset="0"/>
+                <a:cs typeface="Courier New" panose="02070309020205020404" pitchFamily="49" charset="0"/>
+              </a:rPr>
+              <a:t>...</a:t>
+            </a:r>
+            <a:endParaRPr lang="en-US" dirty="0">
+              <a:latin typeface="Courier New" panose="02070309020205020404" pitchFamily="49" charset="0"/>
+              <a:cs typeface="Courier New" panose="02070309020205020404" pitchFamily="49" charset="0"/>
+            </a:endParaRPr>
+          </a:p>
+          <a:p>
+            <a:pPr marL="0" indent="0">
+              <a:buNone/>
+            </a:pPr>
+            <a:r>
+              <a:rPr lang="sk-SK" b="1" dirty="0" err="1">
+                <a:cs typeface="Courier New" panose="02070309020205020404" pitchFamily="49" charset="0"/>
+              </a:rPr>
+              <a:t>Pod-podkapitola</a:t>
+            </a:r>
+            <a:r>
+              <a:rPr lang="sk-SK" b="1" dirty="0">
+                <a:cs typeface="Courier New" panose="02070309020205020404" pitchFamily="49" charset="0"/>
+              </a:rPr>
+              <a:t>:</a:t>
+            </a:r>
+            <a:endParaRPr lang="en-US" b="1" dirty="0">
+              <a:cs typeface="Courier New" panose="02070309020205020404" pitchFamily="49" charset="0"/>
+            </a:endParaRPr>
+          </a:p>
+          <a:p>
+            <a:pPr marL="0" indent="0">
+              <a:buNone/>
+            </a:pPr>
+            <a:r>
+              <a:rPr lang="en-US" dirty="0">
+                <a:latin typeface="Courier New" panose="02070309020205020404" pitchFamily="49" charset="0"/>
+                <a:cs typeface="Courier New" panose="02070309020205020404" pitchFamily="49" charset="0"/>
+              </a:rPr>
+              <a:t>\subsection{</a:t>
+            </a:r>
+            <a:r>
+              <a:rPr lang="sk-SK" dirty="0" err="1">
+                <a:latin typeface="Courier New" panose="02070309020205020404" pitchFamily="49" charset="0"/>
+                <a:cs typeface="Courier New" panose="02070309020205020404" pitchFamily="49" charset="0"/>
+              </a:rPr>
+              <a:t>Nazov</a:t>
+            </a:r>
+            <a:r>
+              <a:rPr lang="en-US" dirty="0">
+                <a:latin typeface="Courier New" panose="02070309020205020404" pitchFamily="49" charset="0"/>
+                <a:cs typeface="Courier New" panose="02070309020205020404" pitchFamily="49" charset="0"/>
+              </a:rPr>
+              <a:t>}</a:t>
+            </a:r>
+          </a:p>
+          <a:p>
+            <a:pPr marL="0" indent="0">
+              <a:buNone/>
+            </a:pPr>
+            <a:r>
+              <a:rPr lang="en-US" dirty="0">
+                <a:latin typeface="Courier New" panose="02070309020205020404" pitchFamily="49" charset="0"/>
+                <a:cs typeface="Courier New" panose="02070309020205020404" pitchFamily="49" charset="0"/>
+              </a:rPr>
+              <a:t>Text</a:t>
+            </a:r>
+            <a:r>
+              <a:rPr lang="sk-SK" dirty="0">
+                <a:latin typeface="Courier New" panose="02070309020205020404" pitchFamily="49" charset="0"/>
+                <a:cs typeface="Courier New" panose="02070309020205020404" pitchFamily="49" charset="0"/>
+              </a:rPr>
+              <a:t>...</a:t>
+            </a:r>
+            <a:endParaRPr lang="en-US" dirty="0">
+              <a:latin typeface="Courier New" panose="02070309020205020404" pitchFamily="49" charset="0"/>
+              <a:cs typeface="Courier New" panose="02070309020205020404" pitchFamily="49" charset="0"/>
+            </a:endParaRPr>
+          </a:p>
+          <a:p>
+            <a:pPr marL="0" indent="0">
+              <a:buNone/>
+            </a:pPr>
+            <a:r>
+              <a:rPr lang="sk-SK" b="1" dirty="0" err="1">
+                <a:cs typeface="Courier New" panose="02070309020205020404" pitchFamily="49" charset="0"/>
+              </a:rPr>
+              <a:t>Pod-pod-podkapitola</a:t>
+            </a:r>
+            <a:r>
+              <a:rPr lang="sk-SK" b="1" dirty="0">
+                <a:cs typeface="Courier New" panose="02070309020205020404" pitchFamily="49" charset="0"/>
+              </a:rPr>
+              <a:t>:</a:t>
+            </a:r>
+            <a:endParaRPr lang="en-US" b="1" dirty="0">
+              <a:cs typeface="Courier New" panose="02070309020205020404" pitchFamily="49" charset="0"/>
+            </a:endParaRPr>
+          </a:p>
+          <a:p>
+            <a:pPr marL="0" indent="0">
+              <a:buNone/>
+            </a:pPr>
+            <a:r>
+              <a:rPr lang="en-US" dirty="0">
+                <a:latin typeface="Courier New" panose="02070309020205020404" pitchFamily="49" charset="0"/>
+                <a:cs typeface="Courier New" panose="02070309020205020404" pitchFamily="49" charset="0"/>
+              </a:rPr>
+              <a:t>\subsubsection{</a:t>
+            </a:r>
+            <a:r>
+              <a:rPr lang="sk-SK" dirty="0" err="1">
+                <a:latin typeface="Courier New" panose="02070309020205020404" pitchFamily="49" charset="0"/>
+                <a:cs typeface="Courier New" panose="02070309020205020404" pitchFamily="49" charset="0"/>
+              </a:rPr>
+              <a:t>Nazov</a:t>
+            </a:r>
+            <a:r>
+              <a:rPr lang="en-US" dirty="0">
+                <a:latin typeface="Courier New" panose="02070309020205020404" pitchFamily="49" charset="0"/>
+                <a:cs typeface="Courier New" panose="02070309020205020404" pitchFamily="49" charset="0"/>
+              </a:rPr>
+              <a:t>}</a:t>
+            </a:r>
+          </a:p>
+          <a:p>
+            <a:pPr marL="0" indent="0">
+              <a:buNone/>
+            </a:pPr>
+            <a:r>
+              <a:rPr lang="en-US" dirty="0">
+                <a:latin typeface="Courier New" panose="02070309020205020404" pitchFamily="49" charset="0"/>
+                <a:cs typeface="Courier New" panose="02070309020205020404" pitchFamily="49" charset="0"/>
+              </a:rPr>
+              <a:t>Text</a:t>
+            </a:r>
+            <a:r>
+              <a:rPr lang="sk-SK" dirty="0">
+                <a:latin typeface="Courier New" panose="02070309020205020404" pitchFamily="49" charset="0"/>
+                <a:cs typeface="Courier New" panose="02070309020205020404" pitchFamily="49" charset="0"/>
+              </a:rPr>
+              <a:t>...</a:t>
+            </a:r>
+            <a:endParaRPr lang="en-US" dirty="0">
+              <a:latin typeface="Courier New" panose="02070309020205020404" pitchFamily="49" charset="0"/>
+              <a:cs typeface="Courier New" panose="02070309020205020404" pitchFamily="49" charset="0"/>
+            </a:endParaRPr>
+          </a:p>
+        </p:txBody>
+      </p:sp>
+      <p:sp>
+        <p:nvSpPr>
+          <p:cNvPr id="4" name="Date Placeholder 3"/>
+          <p:cNvSpPr>
+            <a:spLocks noGrp="1"/>
+          </p:cNvSpPr>
+          <p:nvPr>
+            <p:ph type="dt" sz="half" idx="10"/>
+          </p:nvPr>
+        </p:nvSpPr>
+        <p:spPr/>
+        <p:txBody>
+          <a:bodyPr/>
+          <a:lstStyle/>
+          <a:p>
+            <a:pPr>
+              <a:defRPr/>
+            </a:pPr>
+            <a:r>
+              <a:rPr lang="en-US"/>
+              <a:t>Dec. 2019</a:t>
+            </a:r>
+            <a:endParaRPr lang="en-US" dirty="0"/>
+          </a:p>
+        </p:txBody>
+      </p:sp>
+      <p:sp>
+        <p:nvSpPr>
+          <p:cNvPr id="5" name="Footer Placeholder 4"/>
+          <p:cNvSpPr>
+            <a:spLocks noGrp="1"/>
+          </p:cNvSpPr>
+          <p:nvPr>
+            <p:ph type="ftr" sz="quarter" idx="11"/>
+          </p:nvPr>
+        </p:nvSpPr>
+        <p:spPr/>
+        <p:txBody>
+          <a:bodyPr/>
+          <a:lstStyle/>
+          <a:p>
+            <a:pPr>
+              <a:defRPr/>
+            </a:pPr>
+            <a:r>
+              <a:rPr lang="en-US"/>
+              <a:t>LaTeX Seminár</a:t>
+            </a:r>
+            <a:endParaRPr lang="en-US" dirty="0"/>
+          </a:p>
+        </p:txBody>
+      </p:sp>
+      <p:sp>
+        <p:nvSpPr>
+          <p:cNvPr id="6" name="Slide Number Placeholder 5"/>
+          <p:cNvSpPr>
+            <a:spLocks noGrp="1"/>
+          </p:cNvSpPr>
+          <p:nvPr>
+            <p:ph type="sldNum" sz="quarter" idx="12"/>
+          </p:nvPr>
+        </p:nvSpPr>
+        <p:spPr/>
+        <p:txBody>
+          <a:bodyPr/>
+          <a:lstStyle/>
+          <a:p>
+            <a:pPr>
+              <a:defRPr/>
+            </a:pPr>
+            <a:fld id="{CB8C83D1-3F28-4854-B4AE-D4A71392F432}" type="slidenum">
+              <a:rPr lang="en-US" smtClean="0"/>
+              <a:pPr>
+                <a:defRPr/>
+              </a:pPr>
+              <a:t>13</a:t>
+            </a:fld>
+            <a:endParaRPr lang="en-US" dirty="0"/>
+          </a:p>
+        </p:txBody>
+      </p:sp>
+    </p:spTree>
+    <p:extLst>
+      <p:ext uri="{BB962C8B-B14F-4D97-AF65-F5344CB8AC3E}">
+        <p14:creationId xmlns:p14="http://schemas.microsoft.com/office/powerpoint/2010/main" val="4281868456"/>
+      </p:ext>
+    </p:extLst>
+  </p:cSld>
+  <p:clrMapOvr>
+    <a:masterClrMapping/>
+  </p:clrMapOvr>
+</p:sld>
+</file>
+
 <file path=ppt/slides/slide14.xml><?xml version="1.0" encoding="utf-8"?>
 <p:sld xmlns:a="http://schemas.openxmlformats.org/drawingml/2006/main" xmlns:r="http://schemas.openxmlformats.org/officeDocument/2006/relationships" xmlns:p="http://schemas.openxmlformats.org/presentationml/2006/main">
   <p:cSld>
@@ -7482,16 +7581,8 @@
           <a:lstStyle/>
           <a:p>
             <a:r>
-              <a:rPr lang="en-US" dirty="0" err="1"/>
-              <a:t>Odkazy</a:t>
-            </a:r>
-            <a:r>
-              <a:rPr lang="en-US" dirty="0"/>
-              <a:t> </a:t>
-            </a:r>
-            <a:r>
               <a:rPr lang="sk-SK" dirty="0"/>
-              <a:t>štruktúra dokumentu</a:t>
+              <a:t>Názvoslovie súčasti dokumentu</a:t>
             </a:r>
             <a:endParaRPr lang="en-US" dirty="0"/>
           </a:p>
@@ -7521,95 +7612,81 @@
               <a:rPr lang="sk-SK" b="1" dirty="0">
                 <a:cs typeface="Courier New" panose="02070309020205020404" pitchFamily="49" charset="0"/>
               </a:rPr>
-              <a:t>LaTeX automaticky spravuje odkazy na štruktúru dokumentu. Najprv musíme označiť miesto </a:t>
-            </a:r>
-            <a:r>
-              <a:rPr lang="hu-HU" b="1" dirty="0">
-                <a:cs typeface="Courier New" panose="02070309020205020404" pitchFamily="49" charset="0"/>
-              </a:rPr>
-              <a:t>(v</a:t>
+              <a:t>LaTeX obsahuje vnútorné názvy častí dokumentu po anglicky, eg. bude volať kapitolu ako </a:t>
             </a:r>
             <a:r>
               <a:rPr lang="sk-SK" b="1" dirty="0" err="1">
                 <a:cs typeface="Courier New" panose="02070309020205020404" pitchFamily="49" charset="0"/>
               </a:rPr>
-              <a:t>äčšinou</a:t>
+              <a:t>Chapter</a:t>
             </a:r>
             <a:r>
               <a:rPr lang="sk-SK" b="1" dirty="0">
                 <a:cs typeface="Courier New" panose="02070309020205020404" pitchFamily="49" charset="0"/>
               </a:rPr>
-              <a:t> pod príkazom na štruktúru</a:t>
-            </a:r>
-            <a:r>
-              <a:rPr lang="hu-HU" b="1" dirty="0">
-                <a:cs typeface="Courier New" panose="02070309020205020404" pitchFamily="49" charset="0"/>
-              </a:rPr>
-              <a:t>) s </a:t>
-            </a:r>
-            <a:r>
-              <a:rPr lang="hu-HU" b="1" dirty="0" err="1">
-                <a:cs typeface="Courier New" panose="02070309020205020404" pitchFamily="49" charset="0"/>
-              </a:rPr>
-              <a:t>takzvanou</a:t>
-            </a:r>
-            <a:r>
-              <a:rPr lang="hu-HU" b="1" dirty="0">
-                <a:cs typeface="Courier New" panose="02070309020205020404" pitchFamily="49" charset="0"/>
-              </a:rPr>
-              <a:t> </a:t>
-            </a:r>
-            <a:r>
-              <a:rPr lang="en-US" b="1" dirty="0">
-                <a:cs typeface="Courier New" panose="02070309020205020404" pitchFamily="49" charset="0"/>
-              </a:rPr>
-              <a:t>“</a:t>
-            </a:r>
-            <a:r>
-              <a:rPr lang="en-US" b="1" dirty="0" err="1">
-                <a:cs typeface="Courier New" panose="02070309020205020404" pitchFamily="49" charset="0"/>
-              </a:rPr>
-              <a:t>etiketou</a:t>
-            </a:r>
-            <a:r>
-              <a:rPr lang="en-US" b="1" dirty="0">
-                <a:cs typeface="Courier New" panose="02070309020205020404" pitchFamily="49" charset="0"/>
-              </a:rPr>
-              <a:t>”, napr</a:t>
+              <a:t>. Ak to chceme zmeniť na slovenčinu, musíme zavolať knižnicu „</a:t>
             </a:r>
             <a:r>
               <a:rPr lang="sk-SK" b="1" dirty="0" err="1">
                 <a:cs typeface="Courier New" panose="02070309020205020404" pitchFamily="49" charset="0"/>
               </a:rPr>
-              <a:t>íklad</a:t>
+              <a:t>babel</a:t>
             </a:r>
             <a:r>
               <a:rPr lang="sk-SK" b="1" dirty="0">
                 <a:cs typeface="Courier New" panose="02070309020205020404" pitchFamily="49" charset="0"/>
               </a:rPr>
-              <a:t>:</a:t>
-            </a:r>
-          </a:p>
-          <a:p>
-            <a:pPr marL="0" indent="0">
-              <a:buNone/>
-            </a:pPr>
-            <a:r>
-              <a:rPr lang="en-US" dirty="0">
-                <a:latin typeface="Courier New" panose="02070309020205020404" pitchFamily="49" charset="0"/>
-                <a:cs typeface="Courier New" panose="02070309020205020404" pitchFamily="49" charset="0"/>
-              </a:rPr>
-              <a:t>\section{Toto je </a:t>
-            </a:r>
-            <a:r>
-              <a:rPr lang="en-US" dirty="0" err="1">
-                <a:latin typeface="Courier New" panose="02070309020205020404" pitchFamily="49" charset="0"/>
-                <a:cs typeface="Courier New" panose="02070309020205020404" pitchFamily="49" charset="0"/>
-              </a:rPr>
-              <a:t>podkapitola</a:t>
-            </a:r>
-            <a:r>
-              <a:rPr lang="en-US" dirty="0">
+              <a:t>“ pred začiatkom dokumentu:</a:t>
+            </a:r>
+          </a:p>
+          <a:p>
+            <a:pPr marL="0" indent="0">
+              <a:buNone/>
+            </a:pPr>
+            <a:r>
+              <a:rPr lang="sk-SK" dirty="0">
+                <a:latin typeface="Courier New" panose="02070309020205020404" pitchFamily="49" charset="0"/>
+                <a:cs typeface="Courier New" panose="02070309020205020404" pitchFamily="49" charset="0"/>
+              </a:rPr>
+              <a:t>\</a:t>
+            </a:r>
+            <a:r>
+              <a:rPr lang="sk-SK" dirty="0" err="1">
+                <a:latin typeface="Courier New" panose="02070309020205020404" pitchFamily="49" charset="0"/>
+                <a:cs typeface="Courier New" panose="02070309020205020404" pitchFamily="49" charset="0"/>
+              </a:rPr>
+              <a:t>usepackage</a:t>
+            </a:r>
+            <a:r>
+              <a:rPr lang="sk-SK" dirty="0">
+                <a:latin typeface="Courier New" panose="02070309020205020404" pitchFamily="49" charset="0"/>
+                <a:cs typeface="Courier New" panose="02070309020205020404" pitchFamily="49" charset="0"/>
+              </a:rPr>
+              <a:t>[</a:t>
+            </a:r>
+            <a:r>
+              <a:rPr lang="sk-SK" dirty="0" err="1">
+                <a:latin typeface="Courier New" panose="02070309020205020404" pitchFamily="49" charset="0"/>
+                <a:cs typeface="Courier New" panose="02070309020205020404" pitchFamily="49" charset="0"/>
+              </a:rPr>
+              <a:t>slovak</a:t>
+            </a:r>
+            <a:r>
+              <a:rPr lang="sk-SK" dirty="0">
+                <a:latin typeface="Courier New" panose="02070309020205020404" pitchFamily="49" charset="0"/>
+                <a:cs typeface="Courier New" panose="02070309020205020404" pitchFamily="49" charset="0"/>
+              </a:rPr>
+              <a:t>]{</a:t>
+            </a:r>
+            <a:r>
+              <a:rPr lang="sk-SK" dirty="0" err="1">
+                <a:latin typeface="Courier New" panose="02070309020205020404" pitchFamily="49" charset="0"/>
+                <a:cs typeface="Courier New" panose="02070309020205020404" pitchFamily="49" charset="0"/>
+              </a:rPr>
+              <a:t>babel</a:t>
+            </a:r>
+            <a:r>
+              <a:rPr lang="sk-SK" dirty="0">
                 <a:latin typeface="Courier New" panose="02070309020205020404" pitchFamily="49" charset="0"/>
                 <a:cs typeface="Courier New" panose="02070309020205020404" pitchFamily="49" charset="0"/>
               </a:rPr>
@@ -7620,334 +7697,19 @@
             <a:pPr marL="0" indent="0">
               <a:buNone/>
             </a:pPr>
-            <a:r>
-              <a:rPr lang="en-US" b="1" dirty="0">
-                <a:latin typeface="Courier New" panose="02070309020205020404" pitchFamily="49" charset="0"/>
-                <a:cs typeface="Courier New" panose="02070309020205020404" pitchFamily="49" charset="0"/>
-              </a:rPr>
-              <a:t>\label{</a:t>
-            </a:r>
-            <a:r>
-              <a:rPr lang="en-US" b="1" dirty="0" err="1">
-                <a:latin typeface="Courier New" panose="02070309020205020404" pitchFamily="49" charset="0"/>
-                <a:cs typeface="Courier New" panose="02070309020205020404" pitchFamily="49" charset="0"/>
-              </a:rPr>
-              <a:t>mojnazov</a:t>
-            </a:r>
-            <a:r>
-              <a:rPr lang="en-US" b="1" dirty="0">
-                <a:latin typeface="Courier New" panose="02070309020205020404" pitchFamily="49" charset="0"/>
-                <a:cs typeface="Courier New" panose="02070309020205020404" pitchFamily="49" charset="0"/>
-              </a:rPr>
-              <a:t>}</a:t>
-            </a:r>
-          </a:p>
-          <a:p>
-            <a:pPr marL="0" indent="0">
-              <a:buNone/>
-            </a:pPr>
-            <a:r>
-              <a:rPr lang="en-US" dirty="0" err="1">
-                <a:latin typeface="Courier New" panose="02070309020205020404" pitchFamily="49" charset="0"/>
-                <a:cs typeface="Courier New" panose="02070309020205020404" pitchFamily="49" charset="0"/>
-              </a:rPr>
-              <a:t>Skvely</a:t>
-            </a:r>
-            <a:r>
-              <a:rPr lang="en-US" dirty="0">
-                <a:latin typeface="Courier New" panose="02070309020205020404" pitchFamily="49" charset="0"/>
-                <a:cs typeface="Courier New" panose="02070309020205020404" pitchFamily="49" charset="0"/>
-              </a:rPr>
-              <a:t> text </a:t>
-            </a:r>
-            <a:r>
-              <a:rPr lang="en-US" dirty="0" err="1">
-                <a:latin typeface="Courier New" panose="02070309020205020404" pitchFamily="49" charset="0"/>
-                <a:cs typeface="Courier New" panose="02070309020205020404" pitchFamily="49" charset="0"/>
-              </a:rPr>
-              <a:t>podkapitoly</a:t>
-            </a:r>
-            <a:endParaRPr lang="sk-SK" dirty="0">
+            <a:endParaRPr lang="sk-SK" b="1" dirty="0">
+              <a:cs typeface="Courier New" panose="02070309020205020404" pitchFamily="49" charset="0"/>
+            </a:endParaRPr>
+          </a:p>
+          <a:p>
+            <a:pPr marL="0" indent="0">
+              <a:buNone/>
+            </a:pPr>
+            <a:endParaRPr lang="en-US" dirty="0">
               <a:latin typeface="Courier New" panose="02070309020205020404" pitchFamily="49" charset="0"/>
               <a:cs typeface="Courier New" panose="02070309020205020404" pitchFamily="49" charset="0"/>
             </a:endParaRPr>
           </a:p>
-          <a:p>
-            <a:pPr marL="0" indent="0">
-              <a:buNone/>
-            </a:pPr>
-            <a:r>
-              <a:rPr lang="sk-SK" b="1" dirty="0">
-                <a:cs typeface="Courier New" panose="02070309020205020404" pitchFamily="49" charset="0"/>
-              </a:rPr>
-              <a:t>Potom môžeme odkazovať na to miesto v texte:</a:t>
-            </a:r>
-            <a:endParaRPr lang="en-US" b="1" dirty="0">
-              <a:cs typeface="Courier New" panose="02070309020205020404" pitchFamily="49" charset="0"/>
-            </a:endParaRPr>
-          </a:p>
-          <a:p>
-            <a:pPr marL="0" indent="0">
-              <a:buNone/>
-            </a:pPr>
-            <a:r>
-              <a:rPr lang="en-US" dirty="0">
-                <a:latin typeface="Courier New" panose="02070309020205020404" pitchFamily="49" charset="0"/>
-                <a:cs typeface="Courier New" panose="02070309020205020404" pitchFamily="49" charset="0"/>
-              </a:rPr>
-              <a:t>V </a:t>
-            </a:r>
-            <a:r>
-              <a:rPr lang="en-US" dirty="0" err="1">
-                <a:latin typeface="Courier New" panose="02070309020205020404" pitchFamily="49" charset="0"/>
-                <a:cs typeface="Courier New" panose="02070309020205020404" pitchFamily="49" charset="0"/>
-              </a:rPr>
-              <a:t>texte</a:t>
-            </a:r>
-            <a:r>
-              <a:rPr lang="en-US" dirty="0">
-                <a:latin typeface="Courier New" panose="02070309020205020404" pitchFamily="49" charset="0"/>
-                <a:cs typeface="Courier New" panose="02070309020205020404" pitchFamily="49" charset="0"/>
-              </a:rPr>
-              <a:t> </a:t>
-            </a:r>
-            <a:r>
-              <a:rPr lang="en-US" dirty="0" err="1">
-                <a:latin typeface="Courier New" panose="02070309020205020404" pitchFamily="49" charset="0"/>
-                <a:cs typeface="Courier New" panose="02070309020205020404" pitchFamily="49" charset="0"/>
-              </a:rPr>
-              <a:t>mozeme</a:t>
-            </a:r>
-            <a:r>
-              <a:rPr lang="en-US" dirty="0">
-                <a:latin typeface="Courier New" panose="02070309020205020404" pitchFamily="49" charset="0"/>
-                <a:cs typeface="Courier New" panose="02070309020205020404" pitchFamily="49" charset="0"/>
-              </a:rPr>
-              <a:t> </a:t>
-            </a:r>
-            <a:r>
-              <a:rPr lang="en-US" dirty="0" err="1">
-                <a:latin typeface="Courier New" panose="02070309020205020404" pitchFamily="49" charset="0"/>
-                <a:cs typeface="Courier New" panose="02070309020205020404" pitchFamily="49" charset="0"/>
-              </a:rPr>
-              <a:t>odkazat</a:t>
-            </a:r>
-            <a:r>
-              <a:rPr lang="en-US" dirty="0">
-                <a:latin typeface="Courier New" panose="02070309020205020404" pitchFamily="49" charset="0"/>
-                <a:cs typeface="Courier New" panose="02070309020205020404" pitchFamily="49" charset="0"/>
-              </a:rPr>
-              <a:t> na </a:t>
-            </a:r>
-            <a:r>
-              <a:rPr lang="en-US" dirty="0" err="1">
-                <a:latin typeface="Courier New" panose="02070309020205020404" pitchFamily="49" charset="0"/>
-                <a:cs typeface="Courier New" panose="02070309020205020404" pitchFamily="49" charset="0"/>
-              </a:rPr>
-              <a:t>strukturu</a:t>
-            </a:r>
-            <a:r>
-              <a:rPr lang="en-US" dirty="0">
-                <a:latin typeface="Courier New" panose="02070309020205020404" pitchFamily="49" charset="0"/>
-                <a:cs typeface="Courier New" panose="02070309020205020404" pitchFamily="49" charset="0"/>
-              </a:rPr>
-              <a:t>, </a:t>
-            </a:r>
-            <a:r>
-              <a:rPr lang="en-US" dirty="0" err="1">
-                <a:latin typeface="Courier New" panose="02070309020205020404" pitchFamily="49" charset="0"/>
-                <a:cs typeface="Courier New" panose="02070309020205020404" pitchFamily="49" charset="0"/>
-              </a:rPr>
-              <a:t>ako</a:t>
-            </a:r>
-            <a:r>
-              <a:rPr lang="en-US" dirty="0">
-                <a:latin typeface="Courier New" panose="02070309020205020404" pitchFamily="49" charset="0"/>
-                <a:cs typeface="Courier New" panose="02070309020205020404" pitchFamily="49" charset="0"/>
-              </a:rPr>
-              <a:t> </a:t>
-            </a:r>
-            <a:r>
-              <a:rPr lang="en-US" dirty="0" err="1">
-                <a:latin typeface="Courier New" panose="02070309020205020404" pitchFamily="49" charset="0"/>
-                <a:cs typeface="Courier New" panose="02070309020205020404" pitchFamily="49" charset="0"/>
-              </a:rPr>
-              <a:t>napriklad</a:t>
-            </a:r>
-            <a:r>
-              <a:rPr lang="en-US" dirty="0">
-                <a:latin typeface="Courier New" panose="02070309020205020404" pitchFamily="49" charset="0"/>
-                <a:cs typeface="Courier New" panose="02070309020205020404" pitchFamily="49" charset="0"/>
-              </a:rPr>
-              <a:t> v </a:t>
-            </a:r>
-            <a:r>
-              <a:rPr lang="en-US" dirty="0" err="1">
-                <a:latin typeface="Courier New" panose="02070309020205020404" pitchFamily="49" charset="0"/>
-                <a:cs typeface="Courier New" panose="02070309020205020404" pitchFamily="49" charset="0"/>
-              </a:rPr>
-              <a:t>Kap</a:t>
-            </a:r>
-            <a:r>
-              <a:rPr lang="en-US" dirty="0">
-                <a:latin typeface="Courier New" panose="02070309020205020404" pitchFamily="49" charset="0"/>
-                <a:cs typeface="Courier New" panose="02070309020205020404" pitchFamily="49" charset="0"/>
-              </a:rPr>
-              <a:t>. </a:t>
-            </a:r>
-            <a:r>
-              <a:rPr lang="en-US" b="1" dirty="0">
-                <a:latin typeface="Courier New" panose="02070309020205020404" pitchFamily="49" charset="0"/>
-                <a:cs typeface="Courier New" panose="02070309020205020404" pitchFamily="49" charset="0"/>
-              </a:rPr>
-              <a:t>\ref{</a:t>
-            </a:r>
-            <a:r>
-              <a:rPr lang="en-US" b="1" dirty="0" err="1">
-                <a:latin typeface="Courier New" panose="02070309020205020404" pitchFamily="49" charset="0"/>
-                <a:cs typeface="Courier New" panose="02070309020205020404" pitchFamily="49" charset="0"/>
-              </a:rPr>
-              <a:t>mojnazov</a:t>
-            </a:r>
-            <a:r>
-              <a:rPr lang="en-US" b="1" dirty="0">
-                <a:latin typeface="Courier New" panose="02070309020205020404" pitchFamily="49" charset="0"/>
-                <a:cs typeface="Courier New" panose="02070309020205020404" pitchFamily="49" charset="0"/>
-              </a:rPr>
-              <a:t>}.</a:t>
-            </a:r>
-            <a:endParaRPr lang="sk-SK" b="1" dirty="0">
-              <a:latin typeface="Courier New" panose="02070309020205020404" pitchFamily="49" charset="0"/>
-              <a:cs typeface="Courier New" panose="02070309020205020404" pitchFamily="49" charset="0"/>
-            </a:endParaRPr>
-          </a:p>
-          <a:p>
-            <a:pPr marL="0" indent="0">
-              <a:buNone/>
-            </a:pPr>
-            <a:r>
-              <a:rPr lang="sk-SK" b="1" dirty="0">
-                <a:cs typeface="Courier New" panose="02070309020205020404" pitchFamily="49" charset="0"/>
-              </a:rPr>
-              <a:t>Do konca </a:t>
-            </a:r>
-            <a:r>
-              <a:rPr lang="sk-SK" b="1" dirty="0" err="1">
-                <a:cs typeface="Courier New" panose="02070309020205020404" pitchFamily="49" charset="0"/>
-              </a:rPr>
-              <a:t>mozeme</a:t>
-            </a:r>
-            <a:r>
-              <a:rPr lang="sk-SK" b="1" dirty="0">
-                <a:cs typeface="Courier New" panose="02070309020205020404" pitchFamily="49" charset="0"/>
-              </a:rPr>
-              <a:t> aj </a:t>
-            </a:r>
-            <a:r>
-              <a:rPr lang="sk-SK" b="1" dirty="0" err="1">
-                <a:cs typeface="Courier New" panose="02070309020205020404" pitchFamily="49" charset="0"/>
-              </a:rPr>
-              <a:t>odkazat</a:t>
-            </a:r>
-            <a:r>
-              <a:rPr lang="sk-SK" b="1" dirty="0">
-                <a:cs typeface="Courier New" panose="02070309020205020404" pitchFamily="49" charset="0"/>
-              </a:rPr>
-              <a:t> na </a:t>
-            </a:r>
-            <a:r>
-              <a:rPr lang="sk-SK" b="1" dirty="0" err="1">
-                <a:cs typeface="Courier New" panose="02070309020205020404" pitchFamily="49" charset="0"/>
-              </a:rPr>
-              <a:t>cislo</a:t>
-            </a:r>
-            <a:r>
-              <a:rPr lang="sk-SK" b="1" dirty="0">
-                <a:cs typeface="Courier New" panose="02070309020205020404" pitchFamily="49" charset="0"/>
-              </a:rPr>
-              <a:t> strany cez:</a:t>
-            </a:r>
-          </a:p>
-          <a:p>
-            <a:pPr marL="0" indent="0">
-              <a:buNone/>
-            </a:pPr>
-            <a:r>
-              <a:rPr lang="sk-SK" dirty="0" err="1">
-                <a:latin typeface="Courier New" panose="02070309020205020404" pitchFamily="49" charset="0"/>
-                <a:cs typeface="Courier New" panose="02070309020205020404" pitchFamily="49" charset="0"/>
-              </a:rPr>
-              <a:t>Najdete</a:t>
-            </a:r>
-            <a:r>
-              <a:rPr lang="sk-SK" dirty="0">
-                <a:latin typeface="Courier New" panose="02070309020205020404" pitchFamily="49" charset="0"/>
-                <a:cs typeface="Courier New" panose="02070309020205020404" pitchFamily="49" charset="0"/>
-              </a:rPr>
-              <a:t> na </a:t>
-            </a:r>
-            <a:r>
-              <a:rPr lang="sk-SK" dirty="0" err="1">
-                <a:latin typeface="Courier New" panose="02070309020205020404" pitchFamily="49" charset="0"/>
-                <a:cs typeface="Courier New" panose="02070309020205020404" pitchFamily="49" charset="0"/>
-              </a:rPr>
-              <a:t>stranke</a:t>
-            </a:r>
-            <a:r>
-              <a:rPr lang="sk-SK" dirty="0">
-                <a:latin typeface="Courier New" panose="02070309020205020404" pitchFamily="49" charset="0"/>
-                <a:cs typeface="Courier New" panose="02070309020205020404" pitchFamily="49" charset="0"/>
-              </a:rPr>
-              <a:t> </a:t>
-            </a:r>
-            <a:r>
-              <a:rPr lang="en-US" b="1" dirty="0">
-                <a:latin typeface="Courier New" panose="02070309020205020404" pitchFamily="49" charset="0"/>
-                <a:cs typeface="Courier New" panose="02070309020205020404" pitchFamily="49" charset="0"/>
-              </a:rPr>
-              <a:t>\</a:t>
-            </a:r>
-            <a:r>
-              <a:rPr lang="sk-SK" b="1" dirty="0" err="1">
-                <a:latin typeface="Courier New" panose="02070309020205020404" pitchFamily="49" charset="0"/>
-                <a:cs typeface="Courier New" panose="02070309020205020404" pitchFamily="49" charset="0"/>
-              </a:rPr>
-              <a:t>page</a:t>
-            </a:r>
-            <a:r>
-              <a:rPr lang="en-US" b="1" dirty="0">
-                <a:latin typeface="Courier New" panose="02070309020205020404" pitchFamily="49" charset="0"/>
-                <a:cs typeface="Courier New" panose="02070309020205020404" pitchFamily="49" charset="0"/>
-              </a:rPr>
-              <a:t>ref{</a:t>
-            </a:r>
-            <a:r>
-              <a:rPr lang="en-US" b="1" dirty="0" err="1">
-                <a:latin typeface="Courier New" panose="02070309020205020404" pitchFamily="49" charset="0"/>
-                <a:cs typeface="Courier New" panose="02070309020205020404" pitchFamily="49" charset="0"/>
-              </a:rPr>
-              <a:t>mojnazov</a:t>
-            </a:r>
-            <a:r>
-              <a:rPr lang="en-US" b="1" dirty="0">
-                <a:latin typeface="Courier New" panose="02070309020205020404" pitchFamily="49" charset="0"/>
-                <a:cs typeface="Courier New" panose="02070309020205020404" pitchFamily="49" charset="0"/>
-              </a:rPr>
-              <a:t>}.</a:t>
-            </a:r>
-            <a:endParaRPr lang="sk-SK" b="1" dirty="0">
-              <a:latin typeface="Courier New" panose="02070309020205020404" pitchFamily="49" charset="0"/>
-              <a:cs typeface="Courier New" panose="02070309020205020404" pitchFamily="49" charset="0"/>
-            </a:endParaRPr>
-          </a:p>
-          <a:p>
-            <a:pPr marL="0" indent="0">
-              <a:buNone/>
-            </a:pPr>
-            <a:endParaRPr lang="en-US" b="1" dirty="0">
-              <a:cs typeface="Courier New" panose="02070309020205020404" pitchFamily="49" charset="0"/>
-            </a:endParaRPr>
-          </a:p>
         </p:txBody>
       </p:sp>
       <p:sp>
@@ -7970,7 +7732,7 @@
             </a:pPr>
             <a:r>
               <a:rPr lang="en-US"/>
-              <a:t>July 11, 2016</a:t>
+              <a:t>Dec. 2019</a:t>
             </a:r>
             <a:endParaRPr lang="en-US" dirty="0"/>
           </a:p>
@@ -7996,7 +7758,7 @@
             </a:pPr>
             <a:r>
               <a:rPr lang="en-US"/>
-              <a:t>23rd International Congress on Sound &amp; Vibration</a:t>
+              <a:t>LaTeX Seminár</a:t>
             </a:r>
             <a:endParaRPr lang="en-US" dirty="0"/>
           </a:p>
@@ -8026,264 +7788,6 @@
                 <a:defRPr/>
               </a:pPr>
               <a:t>14</a:t>
-            </a:fld>
-            <a:endParaRPr lang="en-US" dirty="0"/>
-          </a:p>
-        </p:txBody>
-      </p:sp>
-    </p:spTree>
-    <p:extLst>
-      <p:ext uri="{BB962C8B-B14F-4D97-AF65-F5344CB8AC3E}">
-        <p14:creationId xmlns:p14="http://schemas.microsoft.com/office/powerpoint/2010/main" val="3062840861"/>
-      </p:ext>
-    </p:extLst>
-  </p:cSld>
-  <p:clrMapOvr>
-    <a:masterClrMapping/>
-  </p:clrMapOvr>
-</p:sld>
-</file>
-
-<file path=ppt/slides/slide15.xml><?xml version="1.0" encoding="utf-8"?>
-<p:sld xmlns:a="http://schemas.openxmlformats.org/drawingml/2006/main" xmlns:r="http://schemas.openxmlformats.org/officeDocument/2006/relationships" xmlns:p="http://schemas.openxmlformats.org/presentationml/2006/main">
-  <p:cSld>
-    <p:spTree>
-      <p:nvGrpSpPr>
-        <p:cNvPr id="1" name=""/>
-        <p:cNvGrpSpPr/>
-        <p:nvPr/>
-      </p:nvGrpSpPr>
-      <p:grpSpPr>
-        <a:xfrm>
-          <a:off x="0" y="0"/>
-          <a:ext cx="0" cy="0"/>
-          <a:chOff x="0" y="0"/>
-          <a:chExt cx="0" cy="0"/>
-        </a:xfrm>
-      </p:grpSpPr>
-      <p:sp>
-        <p:nvSpPr>
-          <p:cNvPr id="2" name="Title 1"/>
-          <p:cNvSpPr>
-            <a:spLocks noGrp="1"/>
-          </p:cNvSpPr>
-          <p:nvPr>
-            <p:ph type="title"/>
-          </p:nvPr>
-        </p:nvSpPr>
-        <p:spPr/>
-        <p:txBody>
-          <a:bodyPr/>
-          <a:lstStyle/>
-          <a:p>
-            <a:r>
-              <a:rPr lang="sk-SK" dirty="0"/>
-              <a:t>Názvoslovie súčasti dokumentu</a:t>
-            </a:r>
-            <a:endParaRPr lang="en-US" dirty="0"/>
-          </a:p>
-        </p:txBody>
-      </p:sp>
-      <p:sp>
-        <p:nvSpPr>
-          <p:cNvPr id="3" name="Content Placeholder 2"/>
-          <p:cNvSpPr>
-            <a:spLocks noGrp="1"/>
-          </p:cNvSpPr>
-          <p:nvPr>
-            <p:ph idx="1"/>
-          </p:nvPr>
-        </p:nvSpPr>
-        <p:spPr/>
-        <p:txBody>
-          <a:bodyPr>
-            <a:normAutofit/>
-          </a:bodyPr>
-          <a:lstStyle/>
-          <a:p>
-            <a:pPr marL="0" indent="0">
-              <a:buNone/>
-            </a:pPr>
-            <a:r>
-              <a:rPr lang="sk-SK" b="1" dirty="0">
-                <a:cs typeface="Courier New" panose="02070309020205020404" pitchFamily="49" charset="0"/>
-              </a:rPr>
-              <a:t>LaTeX obsahuje vnútorné názvy častí dokumentu po anglicky, eg. bude volať kapitolu ako </a:t>
-            </a:r>
-            <a:r>
-              <a:rPr lang="sk-SK" b="1" dirty="0" err="1">
-                <a:cs typeface="Courier New" panose="02070309020205020404" pitchFamily="49" charset="0"/>
-              </a:rPr>
-              <a:t>Chapter</a:t>
-            </a:r>
-            <a:r>
-              <a:rPr lang="sk-SK" b="1" dirty="0">
-                <a:cs typeface="Courier New" panose="02070309020205020404" pitchFamily="49" charset="0"/>
-              </a:rPr>
-              <a:t>. Ak to chceme zmeniť na slovenčinu, musíme zavolať knižnicu „</a:t>
-            </a:r>
-            <a:r>
-              <a:rPr lang="sk-SK" b="1" dirty="0" err="1">
-                <a:cs typeface="Courier New" panose="02070309020205020404" pitchFamily="49" charset="0"/>
-              </a:rPr>
-              <a:t>babel</a:t>
-            </a:r>
-            <a:r>
-              <a:rPr lang="sk-SK" b="1" dirty="0">
-                <a:cs typeface="Courier New" panose="02070309020205020404" pitchFamily="49" charset="0"/>
-              </a:rPr>
-              <a:t>“ pred začiatkom dokumentu:</a:t>
-            </a:r>
-          </a:p>
-          <a:p>
-            <a:pPr marL="0" indent="0">
-              <a:buNone/>
-            </a:pPr>
-            <a:r>
-              <a:rPr lang="sk-SK" dirty="0">
-                <a:latin typeface="Courier New" panose="02070309020205020404" pitchFamily="49" charset="0"/>
-                <a:cs typeface="Courier New" panose="02070309020205020404" pitchFamily="49" charset="0"/>
-              </a:rPr>
-              <a:t>\</a:t>
-            </a:r>
-            <a:r>
-              <a:rPr lang="sk-SK" dirty="0" err="1">
-                <a:latin typeface="Courier New" panose="02070309020205020404" pitchFamily="49" charset="0"/>
-                <a:cs typeface="Courier New" panose="02070309020205020404" pitchFamily="49" charset="0"/>
-              </a:rPr>
-              <a:t>usepackage</a:t>
-            </a:r>
-            <a:r>
-              <a:rPr lang="sk-SK" dirty="0">
-                <a:latin typeface="Courier New" panose="02070309020205020404" pitchFamily="49" charset="0"/>
-                <a:cs typeface="Courier New" panose="02070309020205020404" pitchFamily="49" charset="0"/>
-              </a:rPr>
-              <a:t>[</a:t>
-            </a:r>
-            <a:r>
-              <a:rPr lang="sk-SK" dirty="0" err="1">
-                <a:latin typeface="Courier New" panose="02070309020205020404" pitchFamily="49" charset="0"/>
-                <a:cs typeface="Courier New" panose="02070309020205020404" pitchFamily="49" charset="0"/>
-              </a:rPr>
-              <a:t>slovak</a:t>
-            </a:r>
-            <a:r>
-              <a:rPr lang="sk-SK" dirty="0">
-                <a:latin typeface="Courier New" panose="02070309020205020404" pitchFamily="49" charset="0"/>
-                <a:cs typeface="Courier New" panose="02070309020205020404" pitchFamily="49" charset="0"/>
-              </a:rPr>
-              <a:t>]{</a:t>
-            </a:r>
-            <a:r>
-              <a:rPr lang="sk-SK" dirty="0" err="1">
-                <a:latin typeface="Courier New" panose="02070309020205020404" pitchFamily="49" charset="0"/>
-                <a:cs typeface="Courier New" panose="02070309020205020404" pitchFamily="49" charset="0"/>
-              </a:rPr>
-              <a:t>babel</a:t>
-            </a:r>
-            <a:r>
-              <a:rPr lang="sk-SK" dirty="0">
-                <a:latin typeface="Courier New" panose="02070309020205020404" pitchFamily="49" charset="0"/>
-                <a:cs typeface="Courier New" panose="02070309020205020404" pitchFamily="49" charset="0"/>
-              </a:rPr>
-              <a:t>}</a:t>
-            </a:r>
-          </a:p>
-          <a:p>
-            <a:pPr marL="0" indent="0">
-              <a:buNone/>
-            </a:pPr>
-            <a:endParaRPr lang="sk-SK" b="1" dirty="0">
-              <a:cs typeface="Courier New" panose="02070309020205020404" pitchFamily="49" charset="0"/>
-            </a:endParaRPr>
-          </a:p>
-          <a:p>
-            <a:pPr marL="0" indent="0">
-              <a:buNone/>
-            </a:pPr>
-            <a:endParaRPr lang="en-US" dirty="0">
-              <a:latin typeface="Courier New" panose="02070309020205020404" pitchFamily="49" charset="0"/>
-              <a:cs typeface="Courier New" panose="02070309020205020404" pitchFamily="49" charset="0"/>
-            </a:endParaRPr>
-          </a:p>
-        </p:txBody>
-      </p:sp>
-      <p:sp>
-        <p:nvSpPr>
-          <p:cNvPr id="4" name="Date Placeholder 3"/>
-          <p:cNvSpPr>
-            <a:spLocks noGrp="1"/>
-          </p:cNvSpPr>
-          <p:nvPr>
-            <p:ph type="dt" sz="half" idx="10"/>
-          </p:nvPr>
-        </p:nvSpPr>
-        <p:spPr/>
-        <p:txBody>
-          <a:bodyPr/>
-          <a:lstStyle/>
-          <a:p>
-            <a:pPr>
-              <a:defRPr/>
-            </a:pPr>
-            <a:r>
-              <a:rPr lang="en-US"/>
-              <a:t>July 11, 2016</a:t>
-            </a:r>
-            <a:endParaRPr lang="en-US" dirty="0"/>
-          </a:p>
-        </p:txBody>
-      </p:sp>
-      <p:sp>
-        <p:nvSpPr>
-          <p:cNvPr id="5" name="Footer Placeholder 4"/>
-          <p:cNvSpPr>
-            <a:spLocks noGrp="1"/>
-          </p:cNvSpPr>
-          <p:nvPr>
-            <p:ph type="ftr" sz="quarter" idx="11"/>
-          </p:nvPr>
-        </p:nvSpPr>
-        <p:spPr/>
-        <p:txBody>
-          <a:bodyPr/>
-          <a:lstStyle/>
-          <a:p>
-            <a:pPr>
-              <a:defRPr/>
-            </a:pPr>
-            <a:r>
-              <a:rPr lang="en-US"/>
-              <a:t>23rd International Congress on Sound &amp; Vibration</a:t>
-            </a:r>
-            <a:endParaRPr lang="en-US" dirty="0"/>
-          </a:p>
-        </p:txBody>
-      </p:sp>
-      <p:sp>
-        <p:nvSpPr>
-          <p:cNvPr id="6" name="Slide Number Placeholder 5"/>
-          <p:cNvSpPr>
-            <a:spLocks noGrp="1"/>
-          </p:cNvSpPr>
-          <p:nvPr>
-            <p:ph type="sldNum" sz="quarter" idx="12"/>
-          </p:nvPr>
-        </p:nvSpPr>
-        <p:spPr/>
-        <p:txBody>
-          <a:bodyPr/>
-          <a:lstStyle/>
-          <a:p>
-            <a:pPr>
-              <a:defRPr/>
-            </a:pPr>
-            <a:fld id="{CB8C83D1-3F28-4854-B4AE-D4A71392F432}" type="slidenum">
-              <a:rPr lang="en-US" smtClean="0"/>
-              <a:pPr>
-                <a:defRPr/>
-              </a:pPr>
-              <a:t>15</a:t>
             </a:fld>
             <a:endParaRPr lang="en-US" dirty="0"/>
           </a:p>
@@ -8450,6 +7954,601 @@
 </p:sld>
 </file>
 
+<file path=ppt/slides/slide15.xml><?xml version="1.0" encoding="utf-8"?>
+<p:sld xmlns:a="http://schemas.openxmlformats.org/drawingml/2006/main" xmlns:r="http://schemas.openxmlformats.org/officeDocument/2006/relationships" xmlns:p="http://schemas.openxmlformats.org/presentationml/2006/main">
+  <p:cSld>
+    <p:spTree>
+      <p:nvGrpSpPr>
+        <p:cNvPr id="1" name=""/>
+        <p:cNvGrpSpPr/>
+        <p:nvPr/>
+      </p:nvGrpSpPr>
+      <p:grpSpPr>
+        <a:xfrm>
+          <a:off x="0" y="0"/>
+          <a:ext cx="0" cy="0"/>
+          <a:chOff x="0" y="0"/>
+          <a:chExt cx="0" cy="0"/>
+        </a:xfrm>
+      </p:grpSpPr>
+      <p:sp>
+        <p:nvSpPr>
+          <p:cNvPr id="2" name="Title 1"/>
+          <p:cNvSpPr>
+            <a:spLocks noGrp="1"/>
+          </p:cNvSpPr>
+          <p:nvPr>
+            <p:ph type="title"/>
+          </p:nvPr>
+        </p:nvSpPr>
+        <p:spPr/>
+        <p:txBody>
+          <a:bodyPr/>
+          <a:lstStyle/>
+          <a:p>
+            <a:r>
+              <a:rPr lang="en-US" dirty="0" err="1"/>
+              <a:t>Odkazy</a:t>
+            </a:r>
+            <a:r>
+              <a:rPr lang="en-US" dirty="0"/>
+              <a:t> </a:t>
+            </a:r>
+            <a:r>
+              <a:rPr lang="sk-SK" dirty="0"/>
+              <a:t>štruktúra dokumentu</a:t>
+            </a:r>
+            <a:endParaRPr lang="en-US" dirty="0"/>
+          </a:p>
+        </p:txBody>
+      </p:sp>
+      <p:sp>
+        <p:nvSpPr>
+          <p:cNvPr id="3" name="Content Placeholder 2"/>
+          <p:cNvSpPr>
+            <a:spLocks noGrp="1"/>
+          </p:cNvSpPr>
+          <p:nvPr>
+            <p:ph idx="1"/>
+          </p:nvPr>
+        </p:nvSpPr>
+        <p:spPr/>
+        <p:txBody>
+          <a:bodyPr>
+            <a:normAutofit/>
+          </a:bodyPr>
+          <a:lstStyle/>
+          <a:p>
+            <a:pPr marL="0" indent="0">
+              <a:buNone/>
+            </a:pPr>
+            <a:r>
+              <a:rPr lang="sk-SK" b="1" dirty="0">
+                <a:cs typeface="Courier New" panose="02070309020205020404" pitchFamily="49" charset="0"/>
+              </a:rPr>
+              <a:t>LaTeX automaticky spravuje odkazy na štruktúru dokumentu. Najprv musíme označiť miesto </a:t>
+            </a:r>
+            <a:r>
+              <a:rPr lang="hu-HU" b="1" dirty="0">
+                <a:cs typeface="Courier New" panose="02070309020205020404" pitchFamily="49" charset="0"/>
+              </a:rPr>
+              <a:t>(v</a:t>
+            </a:r>
+            <a:r>
+              <a:rPr lang="sk-SK" b="1" dirty="0" err="1">
+                <a:cs typeface="Courier New" panose="02070309020205020404" pitchFamily="49" charset="0"/>
+              </a:rPr>
+              <a:t>äčšinou</a:t>
+            </a:r>
+            <a:r>
+              <a:rPr lang="sk-SK" b="1" dirty="0">
+                <a:cs typeface="Courier New" panose="02070309020205020404" pitchFamily="49" charset="0"/>
+              </a:rPr>
+              <a:t> pod príkazom na štruktúru</a:t>
+            </a:r>
+            <a:r>
+              <a:rPr lang="hu-HU" b="1" dirty="0">
+                <a:cs typeface="Courier New" panose="02070309020205020404" pitchFamily="49" charset="0"/>
+              </a:rPr>
+              <a:t>) s </a:t>
+            </a:r>
+            <a:r>
+              <a:rPr lang="hu-HU" b="1" dirty="0" err="1">
+                <a:cs typeface="Courier New" panose="02070309020205020404" pitchFamily="49" charset="0"/>
+              </a:rPr>
+              <a:t>takzvanou</a:t>
+            </a:r>
+            <a:r>
+              <a:rPr lang="hu-HU" b="1" dirty="0">
+                <a:cs typeface="Courier New" panose="02070309020205020404" pitchFamily="49" charset="0"/>
+              </a:rPr>
+              <a:t> </a:t>
+            </a:r>
+            <a:r>
+              <a:rPr lang="en-US" b="1" dirty="0">
+                <a:cs typeface="Courier New" panose="02070309020205020404" pitchFamily="49" charset="0"/>
+              </a:rPr>
+              <a:t>“</a:t>
+            </a:r>
+            <a:r>
+              <a:rPr lang="en-US" b="1" dirty="0" err="1">
+                <a:cs typeface="Courier New" panose="02070309020205020404" pitchFamily="49" charset="0"/>
+              </a:rPr>
+              <a:t>etiketou</a:t>
+            </a:r>
+            <a:r>
+              <a:rPr lang="en-US" b="1" dirty="0">
+                <a:cs typeface="Courier New" panose="02070309020205020404" pitchFamily="49" charset="0"/>
+              </a:rPr>
+              <a:t>”, napr</a:t>
+            </a:r>
+            <a:r>
+              <a:rPr lang="sk-SK" b="1" dirty="0" err="1">
+                <a:cs typeface="Courier New" panose="02070309020205020404" pitchFamily="49" charset="0"/>
+              </a:rPr>
+              <a:t>íklad</a:t>
+            </a:r>
+            <a:r>
+              <a:rPr lang="sk-SK" b="1" dirty="0">
+                <a:cs typeface="Courier New" panose="02070309020205020404" pitchFamily="49" charset="0"/>
+              </a:rPr>
+              <a:t>:</a:t>
+            </a:r>
+          </a:p>
+          <a:p>
+            <a:pPr marL="0" indent="0">
+              <a:buNone/>
+            </a:pPr>
+            <a:r>
+              <a:rPr lang="en-US" dirty="0">
+                <a:latin typeface="Courier New" panose="02070309020205020404" pitchFamily="49" charset="0"/>
+                <a:cs typeface="Courier New" panose="02070309020205020404" pitchFamily="49" charset="0"/>
+              </a:rPr>
+              <a:t>\section{Toto je </a:t>
+            </a:r>
+            <a:r>
+              <a:rPr lang="en-US" dirty="0" err="1">
+                <a:latin typeface="Courier New" panose="02070309020205020404" pitchFamily="49" charset="0"/>
+                <a:cs typeface="Courier New" panose="02070309020205020404" pitchFamily="49" charset="0"/>
+              </a:rPr>
+              <a:t>podkapitola</a:t>
+            </a:r>
+            <a:r>
+              <a:rPr lang="en-US" dirty="0">
+                <a:latin typeface="Courier New" panose="02070309020205020404" pitchFamily="49" charset="0"/>
+                <a:cs typeface="Courier New" panose="02070309020205020404" pitchFamily="49" charset="0"/>
+              </a:rPr>
+              <a:t>}</a:t>
+            </a:r>
+          </a:p>
+          <a:p>
+            <a:pPr marL="0" indent="0">
+              <a:buNone/>
+            </a:pPr>
+            <a:r>
+              <a:rPr lang="en-US" b="1" dirty="0">
+                <a:latin typeface="Courier New" panose="02070309020205020404" pitchFamily="49" charset="0"/>
+                <a:cs typeface="Courier New" panose="02070309020205020404" pitchFamily="49" charset="0"/>
+              </a:rPr>
+              <a:t>\label{</a:t>
+            </a:r>
+            <a:r>
+              <a:rPr lang="en-US" b="1" dirty="0" err="1">
+                <a:latin typeface="Courier New" panose="02070309020205020404" pitchFamily="49" charset="0"/>
+                <a:cs typeface="Courier New" panose="02070309020205020404" pitchFamily="49" charset="0"/>
+              </a:rPr>
+              <a:t>mojnazov</a:t>
+            </a:r>
+            <a:r>
+              <a:rPr lang="en-US" b="1" dirty="0">
+                <a:latin typeface="Courier New" panose="02070309020205020404" pitchFamily="49" charset="0"/>
+                <a:cs typeface="Courier New" panose="02070309020205020404" pitchFamily="49" charset="0"/>
+              </a:rPr>
+              <a:t>}</a:t>
+            </a:r>
+          </a:p>
+          <a:p>
+            <a:pPr marL="0" indent="0">
+              <a:buNone/>
+            </a:pPr>
+            <a:r>
+              <a:rPr lang="en-US" dirty="0" err="1">
+                <a:latin typeface="Courier New" panose="02070309020205020404" pitchFamily="49" charset="0"/>
+                <a:cs typeface="Courier New" panose="02070309020205020404" pitchFamily="49" charset="0"/>
+              </a:rPr>
+              <a:t>Skvely</a:t>
+            </a:r>
+            <a:r>
+              <a:rPr lang="en-US" dirty="0">
+                <a:latin typeface="Courier New" panose="02070309020205020404" pitchFamily="49" charset="0"/>
+                <a:cs typeface="Courier New" panose="02070309020205020404" pitchFamily="49" charset="0"/>
+              </a:rPr>
+              <a:t> text </a:t>
+            </a:r>
+            <a:r>
+              <a:rPr lang="en-US" dirty="0" err="1">
+                <a:latin typeface="Courier New" panose="02070309020205020404" pitchFamily="49" charset="0"/>
+                <a:cs typeface="Courier New" panose="02070309020205020404" pitchFamily="49" charset="0"/>
+              </a:rPr>
+              <a:t>podkapitoly</a:t>
+            </a:r>
+            <a:endParaRPr lang="sk-SK" dirty="0">
+              <a:latin typeface="Courier New" panose="02070309020205020404" pitchFamily="49" charset="0"/>
+              <a:cs typeface="Courier New" panose="02070309020205020404" pitchFamily="49" charset="0"/>
+            </a:endParaRPr>
+          </a:p>
+          <a:p>
+            <a:pPr marL="0" indent="0">
+              <a:buNone/>
+            </a:pPr>
+            <a:r>
+              <a:rPr lang="sk-SK" b="1" dirty="0">
+                <a:cs typeface="Courier New" panose="02070309020205020404" pitchFamily="49" charset="0"/>
+              </a:rPr>
+              <a:t>Potom môžeme odkazovať na to miesto v texte:</a:t>
+            </a:r>
+            <a:endParaRPr lang="en-US" b="1" dirty="0">
+              <a:cs typeface="Courier New" panose="02070309020205020404" pitchFamily="49" charset="0"/>
+            </a:endParaRPr>
+          </a:p>
+          <a:p>
+            <a:pPr marL="0" indent="0">
+              <a:buNone/>
+            </a:pPr>
+            <a:r>
+              <a:rPr lang="en-US" dirty="0">
+                <a:latin typeface="Courier New" panose="02070309020205020404" pitchFamily="49" charset="0"/>
+                <a:cs typeface="Courier New" panose="02070309020205020404" pitchFamily="49" charset="0"/>
+              </a:rPr>
+              <a:t>V </a:t>
+            </a:r>
+            <a:r>
+              <a:rPr lang="en-US" dirty="0" err="1">
+                <a:latin typeface="Courier New" panose="02070309020205020404" pitchFamily="49" charset="0"/>
+                <a:cs typeface="Courier New" panose="02070309020205020404" pitchFamily="49" charset="0"/>
+              </a:rPr>
+              <a:t>texte</a:t>
+            </a:r>
+            <a:r>
+              <a:rPr lang="en-US" dirty="0">
+                <a:latin typeface="Courier New" panose="02070309020205020404" pitchFamily="49" charset="0"/>
+                <a:cs typeface="Courier New" panose="02070309020205020404" pitchFamily="49" charset="0"/>
+              </a:rPr>
+              <a:t> </a:t>
+            </a:r>
+            <a:r>
+              <a:rPr lang="en-US" dirty="0" err="1">
+                <a:latin typeface="Courier New" panose="02070309020205020404" pitchFamily="49" charset="0"/>
+                <a:cs typeface="Courier New" panose="02070309020205020404" pitchFamily="49" charset="0"/>
+              </a:rPr>
+              <a:t>mozeme</a:t>
+            </a:r>
+            <a:r>
+              <a:rPr lang="en-US" dirty="0">
+                <a:latin typeface="Courier New" panose="02070309020205020404" pitchFamily="49" charset="0"/>
+                <a:cs typeface="Courier New" panose="02070309020205020404" pitchFamily="49" charset="0"/>
+              </a:rPr>
+              <a:t> </a:t>
+            </a:r>
+            <a:r>
+              <a:rPr lang="en-US" dirty="0" err="1">
+                <a:latin typeface="Courier New" panose="02070309020205020404" pitchFamily="49" charset="0"/>
+                <a:cs typeface="Courier New" panose="02070309020205020404" pitchFamily="49" charset="0"/>
+              </a:rPr>
+              <a:t>odkazat</a:t>
+            </a:r>
+            <a:r>
+              <a:rPr lang="en-US" dirty="0">
+                <a:latin typeface="Courier New" panose="02070309020205020404" pitchFamily="49" charset="0"/>
+                <a:cs typeface="Courier New" panose="02070309020205020404" pitchFamily="49" charset="0"/>
+              </a:rPr>
+              <a:t> na </a:t>
+            </a:r>
+            <a:r>
+              <a:rPr lang="en-US" dirty="0" err="1">
+                <a:latin typeface="Courier New" panose="02070309020205020404" pitchFamily="49" charset="0"/>
+                <a:cs typeface="Courier New" panose="02070309020205020404" pitchFamily="49" charset="0"/>
+              </a:rPr>
+              <a:t>strukturu</a:t>
+            </a:r>
+            <a:r>
+              <a:rPr lang="en-US" dirty="0">
+                <a:latin typeface="Courier New" panose="02070309020205020404" pitchFamily="49" charset="0"/>
+                <a:cs typeface="Courier New" panose="02070309020205020404" pitchFamily="49" charset="0"/>
+              </a:rPr>
+              <a:t>, </a:t>
+            </a:r>
+            <a:r>
+              <a:rPr lang="en-US" dirty="0" err="1">
+                <a:latin typeface="Courier New" panose="02070309020205020404" pitchFamily="49" charset="0"/>
+                <a:cs typeface="Courier New" panose="02070309020205020404" pitchFamily="49" charset="0"/>
+              </a:rPr>
+              <a:t>ako</a:t>
+            </a:r>
+            <a:r>
+              <a:rPr lang="en-US" dirty="0">
+                <a:latin typeface="Courier New" panose="02070309020205020404" pitchFamily="49" charset="0"/>
+                <a:cs typeface="Courier New" panose="02070309020205020404" pitchFamily="49" charset="0"/>
+              </a:rPr>
+              <a:t> </a:t>
+            </a:r>
+            <a:r>
+              <a:rPr lang="en-US" dirty="0" err="1">
+                <a:latin typeface="Courier New" panose="02070309020205020404" pitchFamily="49" charset="0"/>
+                <a:cs typeface="Courier New" panose="02070309020205020404" pitchFamily="49" charset="0"/>
+              </a:rPr>
+              <a:t>napriklad</a:t>
+            </a:r>
+            <a:r>
+              <a:rPr lang="en-US" dirty="0">
+                <a:latin typeface="Courier New" panose="02070309020205020404" pitchFamily="49" charset="0"/>
+                <a:cs typeface="Courier New" panose="02070309020205020404" pitchFamily="49" charset="0"/>
+              </a:rPr>
+              <a:t> v </a:t>
+            </a:r>
+            <a:r>
+              <a:rPr lang="en-US" dirty="0" err="1">
+                <a:latin typeface="Courier New" panose="02070309020205020404" pitchFamily="49" charset="0"/>
+                <a:cs typeface="Courier New" panose="02070309020205020404" pitchFamily="49" charset="0"/>
+              </a:rPr>
+              <a:t>Kap</a:t>
+            </a:r>
+            <a:r>
+              <a:rPr lang="en-US" dirty="0">
+                <a:latin typeface="Courier New" panose="02070309020205020404" pitchFamily="49" charset="0"/>
+                <a:cs typeface="Courier New" panose="02070309020205020404" pitchFamily="49" charset="0"/>
+              </a:rPr>
+              <a:t>. </a:t>
+            </a:r>
+            <a:r>
+              <a:rPr lang="en-US" b="1" dirty="0">
+                <a:latin typeface="Courier New" panose="02070309020205020404" pitchFamily="49" charset="0"/>
+                <a:cs typeface="Courier New" panose="02070309020205020404" pitchFamily="49" charset="0"/>
+              </a:rPr>
+              <a:t>\ref{</a:t>
+            </a:r>
+            <a:r>
+              <a:rPr lang="en-US" b="1" dirty="0" err="1">
+                <a:latin typeface="Courier New" panose="02070309020205020404" pitchFamily="49" charset="0"/>
+                <a:cs typeface="Courier New" panose="02070309020205020404" pitchFamily="49" charset="0"/>
+              </a:rPr>
+              <a:t>mojnazov</a:t>
+            </a:r>
+            <a:r>
+              <a:rPr lang="en-US" b="1" dirty="0">
+                <a:latin typeface="Courier New" panose="02070309020205020404" pitchFamily="49" charset="0"/>
+                <a:cs typeface="Courier New" panose="02070309020205020404" pitchFamily="49" charset="0"/>
+              </a:rPr>
+              <a:t>}.</a:t>
+            </a:r>
+            <a:endParaRPr lang="sk-SK" b="1" dirty="0">
+              <a:latin typeface="Courier New" panose="02070309020205020404" pitchFamily="49" charset="0"/>
+              <a:cs typeface="Courier New" panose="02070309020205020404" pitchFamily="49" charset="0"/>
+            </a:endParaRPr>
+          </a:p>
+          <a:p>
+            <a:pPr marL="0" indent="0">
+              <a:buNone/>
+            </a:pPr>
+            <a:r>
+              <a:rPr lang="sk-SK" b="1" dirty="0">
+                <a:cs typeface="Courier New" panose="02070309020205020404" pitchFamily="49" charset="0"/>
+              </a:rPr>
+              <a:t>Do konca </a:t>
+            </a:r>
+            <a:r>
+              <a:rPr lang="sk-SK" b="1" dirty="0" err="1">
+                <a:cs typeface="Courier New" panose="02070309020205020404" pitchFamily="49" charset="0"/>
+              </a:rPr>
+              <a:t>mozeme</a:t>
+            </a:r>
+            <a:r>
+              <a:rPr lang="sk-SK" b="1" dirty="0">
+                <a:cs typeface="Courier New" panose="02070309020205020404" pitchFamily="49" charset="0"/>
+              </a:rPr>
+              <a:t> aj </a:t>
+            </a:r>
+            <a:r>
+              <a:rPr lang="sk-SK" b="1" dirty="0" err="1">
+                <a:cs typeface="Courier New" panose="02070309020205020404" pitchFamily="49" charset="0"/>
+              </a:rPr>
+              <a:t>odkazat</a:t>
+            </a:r>
+            <a:r>
+              <a:rPr lang="sk-SK" b="1" dirty="0">
+                <a:cs typeface="Courier New" panose="02070309020205020404" pitchFamily="49" charset="0"/>
+              </a:rPr>
+              <a:t> na </a:t>
+            </a:r>
+            <a:r>
+              <a:rPr lang="sk-SK" b="1" dirty="0" err="1">
+                <a:cs typeface="Courier New" panose="02070309020205020404" pitchFamily="49" charset="0"/>
+              </a:rPr>
+              <a:t>cislo</a:t>
+            </a:r>
+            <a:r>
+              <a:rPr lang="sk-SK" b="1" dirty="0">
+                <a:cs typeface="Courier New" panose="02070309020205020404" pitchFamily="49" charset="0"/>
+              </a:rPr>
+              <a:t> strany cez:</a:t>
+            </a:r>
+          </a:p>
+          <a:p>
+            <a:pPr marL="0" indent="0">
+              <a:buNone/>
+            </a:pPr>
+            <a:r>
+              <a:rPr lang="sk-SK" dirty="0" err="1">
+                <a:latin typeface="Courier New" panose="02070309020205020404" pitchFamily="49" charset="0"/>
+                <a:cs typeface="Courier New" panose="02070309020205020404" pitchFamily="49" charset="0"/>
+              </a:rPr>
+              <a:t>Najdete</a:t>
+            </a:r>
+            <a:r>
+              <a:rPr lang="sk-SK" dirty="0">
+                <a:latin typeface="Courier New" panose="02070309020205020404" pitchFamily="49" charset="0"/>
+                <a:cs typeface="Courier New" panose="02070309020205020404" pitchFamily="49" charset="0"/>
+              </a:rPr>
+              <a:t> na </a:t>
+            </a:r>
+            <a:r>
+              <a:rPr lang="sk-SK" dirty="0" err="1">
+                <a:latin typeface="Courier New" panose="02070309020205020404" pitchFamily="49" charset="0"/>
+                <a:cs typeface="Courier New" panose="02070309020205020404" pitchFamily="49" charset="0"/>
+              </a:rPr>
+              <a:t>stranke</a:t>
+            </a:r>
+            <a:r>
+              <a:rPr lang="sk-SK" dirty="0">
+                <a:latin typeface="Courier New" panose="02070309020205020404" pitchFamily="49" charset="0"/>
+                <a:cs typeface="Courier New" panose="02070309020205020404" pitchFamily="49" charset="0"/>
+              </a:rPr>
+              <a:t> </a:t>
+            </a:r>
+            <a:r>
+              <a:rPr lang="en-US" b="1" dirty="0">
+                <a:latin typeface="Courier New" panose="02070309020205020404" pitchFamily="49" charset="0"/>
+                <a:cs typeface="Courier New" panose="02070309020205020404" pitchFamily="49" charset="0"/>
+              </a:rPr>
+              <a:t>\</a:t>
+            </a:r>
+            <a:r>
+              <a:rPr lang="sk-SK" b="1" dirty="0" err="1">
+                <a:latin typeface="Courier New" panose="02070309020205020404" pitchFamily="49" charset="0"/>
+                <a:cs typeface="Courier New" panose="02070309020205020404" pitchFamily="49" charset="0"/>
+              </a:rPr>
+              <a:t>page</a:t>
+            </a:r>
+            <a:r>
+              <a:rPr lang="en-US" b="1" dirty="0">
+                <a:latin typeface="Courier New" panose="02070309020205020404" pitchFamily="49" charset="0"/>
+                <a:cs typeface="Courier New" panose="02070309020205020404" pitchFamily="49" charset="0"/>
+              </a:rPr>
+              <a:t>ref{</a:t>
+            </a:r>
+            <a:r>
+              <a:rPr lang="en-US" b="1" dirty="0" err="1">
+                <a:latin typeface="Courier New" panose="02070309020205020404" pitchFamily="49" charset="0"/>
+                <a:cs typeface="Courier New" panose="02070309020205020404" pitchFamily="49" charset="0"/>
+              </a:rPr>
+              <a:t>mojnazov</a:t>
+            </a:r>
+            <a:r>
+              <a:rPr lang="en-US" b="1" dirty="0">
+                <a:latin typeface="Courier New" panose="02070309020205020404" pitchFamily="49" charset="0"/>
+                <a:cs typeface="Courier New" panose="02070309020205020404" pitchFamily="49" charset="0"/>
+              </a:rPr>
+              <a:t>}.</a:t>
+            </a:r>
+            <a:endParaRPr lang="sk-SK" b="1" dirty="0">
+              <a:latin typeface="Courier New" panose="02070309020205020404" pitchFamily="49" charset="0"/>
+              <a:cs typeface="Courier New" panose="02070309020205020404" pitchFamily="49" charset="0"/>
+            </a:endParaRPr>
+          </a:p>
+          <a:p>
+            <a:pPr marL="0" indent="0">
+              <a:buNone/>
+            </a:pPr>
+            <a:endParaRPr lang="en-US" b="1" dirty="0">
+              <a:cs typeface="Courier New" panose="02070309020205020404" pitchFamily="49" charset="0"/>
+            </a:endParaRPr>
+          </a:p>
+        </p:txBody>
+      </p:sp>
+      <p:sp>
+        <p:nvSpPr>
+          <p:cNvPr id="4" name="Date Placeholder 3"/>
+          <p:cNvSpPr>
+            <a:spLocks noGrp="1"/>
+          </p:cNvSpPr>
+          <p:nvPr>
+            <p:ph type="dt" sz="half" idx="10"/>
+          </p:nvPr>
+        </p:nvSpPr>
+        <p:spPr/>
+        <p:txBody>
+          <a:bodyPr/>
+          <a:lstStyle/>
+          <a:p>
+            <a:pPr>
+              <a:defRPr/>
+            </a:pPr>
+            <a:r>
+              <a:rPr lang="en-US"/>
+              <a:t>Dec. 2019</a:t>
+            </a:r>
+            <a:endParaRPr lang="en-US" dirty="0"/>
+          </a:p>
+        </p:txBody>
+      </p:sp>
+      <p:sp>
+        <p:nvSpPr>
+          <p:cNvPr id="5" name="Footer Placeholder 4"/>
+          <p:cNvSpPr>
+            <a:spLocks noGrp="1"/>
+          </p:cNvSpPr>
+          <p:nvPr>
+            <p:ph type="ftr" sz="quarter" idx="11"/>
+          </p:nvPr>
+        </p:nvSpPr>
+        <p:spPr/>
+        <p:txBody>
+          <a:bodyPr/>
+          <a:lstStyle/>
+          <a:p>
+            <a:pPr>
+              <a:defRPr/>
+            </a:pPr>
+            <a:r>
+              <a:rPr lang="en-US"/>
+              <a:t>LaTeX Seminár</a:t>
+            </a:r>
+            <a:endParaRPr lang="en-US" dirty="0"/>
+          </a:p>
+        </p:txBody>
+      </p:sp>
+      <p:sp>
+        <p:nvSpPr>
+          <p:cNvPr id="6" name="Slide Number Placeholder 5"/>
+          <p:cNvSpPr>
+            <a:spLocks noGrp="1"/>
+          </p:cNvSpPr>
+          <p:nvPr>
+            <p:ph type="sldNum" sz="quarter" idx="12"/>
+          </p:nvPr>
+        </p:nvSpPr>
+        <p:spPr/>
+        <p:txBody>
+          <a:bodyPr/>
+          <a:lstStyle/>
+          <a:p>
+            <a:pPr>
+              <a:defRPr/>
+            </a:pPr>
+            <a:fld id="{CB8C83D1-3F28-4854-B4AE-D4A71392F432}" type="slidenum">
+              <a:rPr lang="en-US" smtClean="0"/>
+              <a:pPr>
+                <a:defRPr/>
+              </a:pPr>
+              <a:t>15</a:t>
+            </a:fld>
+            <a:endParaRPr lang="en-US" dirty="0"/>
+          </a:p>
+        </p:txBody>
+      </p:sp>
+    </p:spTree>
+    <p:extLst>
+      <p:ext uri="{BB962C8B-B14F-4D97-AF65-F5344CB8AC3E}">
+        <p14:creationId xmlns:p14="http://schemas.microsoft.com/office/powerpoint/2010/main" val="3062840861"/>
+      </p:ext>
+    </p:extLst>
+  </p:cSld>
+  <p:clrMapOvr>
+    <a:masterClrMapping/>
+  </p:clrMapOvr>
+</p:sld>
+</file>
+
 <file path=ppt/slides/slide16.xml><?xml version="1.0" encoding="utf-8"?>
 <p:sld xmlns:a="http://schemas.openxmlformats.org/drawingml/2006/main" xmlns:r="http://schemas.openxmlformats.org/officeDocument/2006/relationships" xmlns:p="http://schemas.openxmlformats.org/presentationml/2006/main">
   <p:cSld>
@@ -8730,7 +8829,7 @@
             </a:pPr>
             <a:r>
               <a:rPr lang="en-US"/>
-              <a:t>July 11, 2016</a:t>
+              <a:t>Dec. 2019</a:t>
             </a:r>
             <a:endParaRPr lang="en-US" dirty="0"/>
           </a:p>
@@ -8756,7 +8855,7 @@
             </a:pPr>
             <a:r>
               <a:rPr lang="en-US"/>
-              <a:t>23rd International Congress on Sound &amp; Vibration</a:t>
+              <a:t>LaTeX Seminár</a:t>
             </a:r>
             <a:endParaRPr lang="en-US" dirty="0"/>
           </a:p>
@@ -9178,7 +9277,7 @@
             </a:pPr>
             <a:r>
               <a:rPr lang="en-US"/>
-              <a:t>July 11, 2016</a:t>
+              <a:t>Dec. 2019</a:t>
             </a:r>
             <a:endParaRPr lang="en-US" dirty="0"/>
           </a:p>
@@ -9204,7 +9303,7 @@
             </a:pPr>
             <a:r>
               <a:rPr lang="en-US"/>
-              <a:t>23rd International Congress on Sound &amp; Vibration</a:t>
+              <a:t>LaTeX Seminár</a:t>
             </a:r>
             <a:endParaRPr lang="en-US" dirty="0"/>
           </a:p>
@@ -9533,7 +9632,7 @@
             </a:pPr>
             <a:r>
               <a:rPr lang="en-US"/>
-              <a:t>July 11, 2016</a:t>
+              <a:t>Dec. 2019</a:t>
             </a:r>
             <a:endParaRPr lang="en-US" dirty="0"/>
           </a:p>
@@ -9559,7 +9658,7 @@
             </a:pPr>
             <a:r>
               <a:rPr lang="en-US"/>
-              <a:t>23rd International Congress on Sound &amp; Vibration</a:t>
+              <a:t>LaTeX Seminár</a:t>
             </a:r>
             <a:endParaRPr lang="en-US" dirty="0"/>
           </a:p>
@@ -9866,7 +9965,7 @@
             </a:pPr>
             <a:r>
               <a:rPr lang="en-US"/>
-              <a:t>July 11, 2016</a:t>
+              <a:t>Dec. 2019</a:t>
             </a:r>
             <a:endParaRPr lang="en-US" dirty="0"/>
           </a:p>
@@ -9892,7 +9991,7 @@
             </a:pPr>
             <a:r>
               <a:rPr lang="en-US"/>
-              <a:t>23rd International Congress on Sound &amp; Vibration</a:t>
+              <a:t>LaTeX Seminár</a:t>
             </a:r>
             <a:endParaRPr lang="en-US" dirty="0"/>
           </a:p>
@@ -10203,7 +10302,7 @@
             </a:pPr>
             <a:r>
               <a:rPr lang="en-US"/>
-              <a:t>July 11, 2016</a:t>
+              <a:t>Dec. 2019</a:t>
             </a:r>
             <a:endParaRPr lang="en-US" dirty="0"/>
           </a:p>
@@ -10229,7 +10328,7 @@
             </a:pPr>
             <a:r>
               <a:rPr lang="en-US"/>
-              <a:t>23rd International Congress on Sound &amp; Vibration</a:t>
+              <a:t>LaTeX Seminár</a:t>
             </a:r>
             <a:endParaRPr lang="en-US" dirty="0"/>
           </a:p>
@@ -10477,7 +10576,7 @@
             </a:pPr>
             <a:r>
               <a:rPr lang="en-US"/>
-              <a:t>July 11, 2016</a:t>
+              <a:t>Dec. 2019</a:t>
             </a:r>
             <a:endParaRPr lang="en-US" dirty="0"/>
           </a:p>
@@ -10503,7 +10602,7 @@
             </a:pPr>
             <a:r>
               <a:rPr lang="en-US"/>
-              <a:t>23rd International Congress on Sound &amp; Vibration</a:t>
+              <a:t>LaTeX Seminár</a:t>
             </a:r>
             <a:endParaRPr lang="en-US" dirty="0"/>
           </a:p>
@@ -10929,7 +11028,7 @@
             </a:pPr>
             <a:r>
               <a:rPr lang="en-US"/>
-              <a:t>July 11, 2016</a:t>
+              <a:t>Dec. 2019</a:t>
             </a:r>
             <a:endParaRPr lang="en-US" dirty="0"/>
           </a:p>
@@ -10955,7 +11054,7 @@
             </a:pPr>
             <a:r>
               <a:rPr lang="en-US"/>
-              <a:t>23rd International Congress on Sound &amp; Vibration</a:t>
+              <a:t>LaTeX Seminár</a:t>
             </a:r>
             <a:endParaRPr lang="en-US" dirty="0"/>
           </a:p>
@@ -11368,7 +11467,7 @@
             </a:pPr>
             <a:r>
               <a:rPr lang="en-US"/>
-              <a:t>July 11, 2016</a:t>
+              <a:t>Dec. 2019</a:t>
             </a:r>
             <a:endParaRPr lang="en-US" dirty="0"/>
           </a:p>
@@ -11394,7 +11493,7 @@
             </a:pPr>
             <a:r>
               <a:rPr lang="en-US"/>
-              <a:t>23rd International Congress on Sound &amp; Vibration</a:t>
+              <a:t>LaTeX Seminár</a:t>
             </a:r>
             <a:endParaRPr lang="en-US" dirty="0"/>
           </a:p>
@@ -11814,7 +11913,7 @@
             </a:pPr>
             <a:r>
               <a:rPr lang="en-US"/>
-              <a:t>July 11, 2016</a:t>
+              <a:t>Dec. 2019</a:t>
             </a:r>
             <a:endParaRPr lang="en-US" dirty="0"/>
           </a:p>
@@ -11840,7 +11939,7 @@
             </a:pPr>
             <a:r>
               <a:rPr lang="en-US"/>
-              <a:t>23rd International Congress on Sound &amp; Vibration</a:t>
+              <a:t>LaTeX Seminár</a:t>
             </a:r>
             <a:endParaRPr lang="en-US" dirty="0"/>
           </a:p>
@@ -12344,7 +12443,7 @@
             </a:pPr>
             <a:r>
               <a:rPr lang="en-US"/>
-              <a:t>July 11, 2016</a:t>
+              <a:t>Dec. 2019</a:t>
             </a:r>
             <a:endParaRPr lang="en-US" dirty="0"/>
           </a:p>
@@ -12370,7 +12469,7 @@
             </a:pPr>
             <a:r>
               <a:rPr lang="en-US"/>
-              <a:t>23rd International Congress on Sound &amp; Vibration</a:t>
+              <a:t>LaTeX Seminár</a:t>
             </a:r>
             <a:endParaRPr lang="en-US" dirty="0"/>
           </a:p>
@@ -12504,7 +12603,7 @@
             </a:pPr>
             <a:r>
               <a:rPr lang="en-US"/>
-              <a:t>July 11, 2016</a:t>
+              <a:t>Dec. 2019</a:t>
             </a:r>
             <a:endParaRPr lang="en-US" dirty="0"/>
           </a:p>
@@ -12530,7 +12629,7 @@
             </a:pPr>
             <a:r>
               <a:rPr lang="en-US"/>
-              <a:t>23rd International Congress on Sound &amp; Vibration</a:t>
+              <a:t>LaTeX Seminár</a:t>
             </a:r>
             <a:endParaRPr lang="en-US" dirty="0"/>
           </a:p>
@@ -13039,7 +13138,7 @@
             </a:pPr>
             <a:r>
               <a:rPr lang="en-US"/>
-              <a:t>July 11, 2016</a:t>
+              <a:t>Dec. 2019</a:t>
             </a:r>
             <a:endParaRPr lang="en-US" dirty="0"/>
           </a:p>
@@ -13065,7 +13164,7 @@
             </a:pPr>
             <a:r>
               <a:rPr lang="en-US"/>
-              <a:t>23rd International Congress on Sound &amp; Vibration</a:t>
+              <a:t>LaTeX Seminár</a:t>
             </a:r>
             <a:endParaRPr lang="en-US" dirty="0"/>
           </a:p>
@@ -13460,7 +13559,7 @@
             </a:pPr>
             <a:r>
               <a:rPr lang="en-US"/>
-              <a:t>July 11, 2016</a:t>
+              <a:t>Dec. 2019</a:t>
             </a:r>
             <a:endParaRPr lang="en-US" dirty="0"/>
           </a:p>
@@ -13486,7 +13585,7 @@
             </a:pPr>
             <a:r>
               <a:rPr lang="en-US"/>
-              <a:t>23rd International Congress on Sound &amp; Vibration</a:t>
+              <a:t>LaTeX Seminár</a:t>
             </a:r>
             <a:endParaRPr lang="en-US" dirty="0"/>
           </a:p>
@@ -13693,7 +13792,7 @@
             </a:pPr>
             <a:r>
               <a:rPr lang="en-US"/>
-              <a:t>July 11, 2016</a:t>
+              <a:t>Dec. 2019</a:t>
             </a:r>
             <a:endParaRPr lang="en-US" dirty="0"/>
           </a:p>
@@ -13719,7 +13818,7 @@
             </a:pPr>
             <a:r>
               <a:rPr lang="en-US"/>
-              <a:t>23rd International Congress on Sound &amp; Vibration</a:t>
+              <a:t>LaTeX Seminár</a:t>
             </a:r>
             <a:endParaRPr lang="en-US" dirty="0"/>
           </a:p>
@@ -13881,7 +13980,7 @@
             </a:pPr>
             <a:r>
               <a:rPr lang="en-US"/>
-              <a:t>July 11, 2016</a:t>
+              <a:t>Dec. 2019</a:t>
             </a:r>
             <a:endParaRPr lang="en-US" dirty="0"/>
           </a:p>
@@ -13907,7 +14006,7 @@
             </a:pPr>
             <a:r>
               <a:rPr lang="en-US"/>
-              <a:t>23rd International Congress on Sound &amp; Vibration</a:t>
+              <a:t>LaTeX Seminár</a:t>
             </a:r>
             <a:endParaRPr lang="en-US" dirty="0"/>
           </a:p>
@@ -14234,7 +14333,7 @@
         <p:spPr/>
         <p:txBody>
           <a:bodyPr>
-            <a:normAutofit/>
+            <a:normAutofit fontScale="85000" lnSpcReduction="20000"/>
           </a:bodyPr>
           <a:lstStyle/>
           <a:p>
@@ -14307,6 +14406,74 @@
                 <a:cs typeface="Courier New" panose="02070309020205020404" pitchFamily="49" charset="0"/>
               </a:rPr>
               <a:t>funkcia</a:t>
+            </a:r>
+            <a:endParaRPr lang="en-US" dirty="0">
+              <a:latin typeface="Courier New" panose="02070309020205020404" pitchFamily="49" charset="0"/>
+              <a:cs typeface="Courier New" panose="02070309020205020404" pitchFamily="49" charset="0"/>
+            </a:endParaRPr>
+          </a:p>
+          <a:p>
+            <a:pPr marL="0" indent="0">
+              <a:buNone/>
+            </a:pPr>
+            <a:r>
+              <a:rPr lang="en-US" dirty="0" err="1">
+                <a:cs typeface="Courier New" panose="02070309020205020404" pitchFamily="49" charset="0"/>
+              </a:rPr>
+              <a:t>napr</a:t>
+            </a:r>
+            <a:r>
+              <a:rPr lang="en-US" dirty="0">
+                <a:cs typeface="Courier New" panose="02070309020205020404" pitchFamily="49" charset="0"/>
+              </a:rPr>
+              <a:t>.</a:t>
+            </a:r>
+          </a:p>
+          <a:p>
+            <a:pPr marL="0" indent="0">
+              <a:buNone/>
+            </a:pPr>
+            <a:r>
+              <a:rPr lang="en-US" dirty="0">
+                <a:latin typeface="Courier New" panose="02070309020205020404" pitchFamily="49" charset="0"/>
+                <a:cs typeface="Courier New" panose="02070309020205020404" pitchFamily="49" charset="0"/>
+              </a:rPr>
+              <a:t>\LaTeX</a:t>
+            </a:r>
+          </a:p>
+          <a:p>
+            <a:pPr marL="0" indent="0">
+              <a:buNone/>
+            </a:pPr>
+            <a:r>
+              <a:rPr lang="sk-SK" dirty="0">
+                <a:cs typeface="Courier New" panose="02070309020205020404" pitchFamily="49" charset="0"/>
+              </a:rPr>
+              <a:t>v</a:t>
+            </a:r>
+            <a:r>
+              <a:rPr lang="en-US" dirty="0" err="1">
+                <a:cs typeface="Courier New" panose="02070309020205020404" pitchFamily="49" charset="0"/>
+              </a:rPr>
+              <a:t>ytla</a:t>
+            </a:r>
+            <a:r>
+              <a:rPr lang="sk-SK" dirty="0">
+                <a:cs typeface="Courier New" panose="02070309020205020404" pitchFamily="49" charset="0"/>
+              </a:rPr>
+              <a:t>čí logo </a:t>
+            </a:r>
+            <a:r>
+              <a:rPr lang="sk-SK" dirty="0" err="1">
+                <a:cs typeface="Courier New" panose="02070309020205020404" pitchFamily="49" charset="0"/>
+              </a:rPr>
+              <a:t>LaTeX</a:t>
+            </a:r>
+            <a:r>
+              <a:rPr lang="sk-SK" dirty="0">
+                <a:cs typeface="Courier New" panose="02070309020205020404" pitchFamily="49" charset="0"/>
+              </a:rPr>
+              <a:t> do textu. Je to citlivé na malé a veľké písmená.</a:t>
             </a:r>
             <a:br>
               <a:rPr lang="en-US" dirty="0">
@@ -14397,12 +14564,77 @@
               </a:rPr>
               <a:t>{parameter}</a:t>
             </a:r>
-            <a:br>
-              <a:rPr lang="en-US" b="1" dirty="0">
-                <a:latin typeface="Courier New" panose="02070309020205020404" pitchFamily="49" charset="0"/>
-                <a:cs typeface="Courier New" panose="02070309020205020404" pitchFamily="49" charset="0"/>
-              </a:rPr>
-            </a:br>
+            <a:r>
+              <a:rPr lang="sk-SK" dirty="0">
+                <a:latin typeface="Courier New" panose="02070309020205020404" pitchFamily="49" charset="0"/>
+                <a:cs typeface="Courier New" panose="02070309020205020404" pitchFamily="49" charset="0"/>
+              </a:rPr>
+              <a:t> </a:t>
+            </a:r>
+          </a:p>
+          <a:p>
+            <a:pPr marL="0" indent="0">
+              <a:buNone/>
+            </a:pPr>
+            <a:r>
+              <a:rPr lang="sk-SK" b="1" dirty="0">
+                <a:latin typeface="Courier New" panose="02070309020205020404" pitchFamily="49" charset="0"/>
+                <a:cs typeface="Courier New" panose="02070309020205020404" pitchFamily="49" charset="0"/>
+              </a:rPr>
+              <a:t>Alebo</a:t>
+            </a:r>
+          </a:p>
+          <a:p>
+            <a:pPr marL="0" indent="0">
+              <a:buNone/>
+            </a:pPr>
+            <a:r>
+              <a:rPr lang="en-US" dirty="0">
+                <a:latin typeface="Courier New" panose="02070309020205020404" pitchFamily="49" charset="0"/>
+                <a:cs typeface="Courier New" panose="02070309020205020404" pitchFamily="49" charset="0"/>
+              </a:rPr>
+              <a:t>\</a:t>
+            </a:r>
+            <a:r>
+              <a:rPr lang="en-US" dirty="0" err="1">
+                <a:latin typeface="Courier New" panose="02070309020205020404" pitchFamily="49" charset="0"/>
+                <a:cs typeface="Courier New" panose="02070309020205020404" pitchFamily="49" charset="0"/>
+              </a:rPr>
+              <a:t>funkcia</a:t>
+            </a:r>
+            <a:r>
+              <a:rPr lang="en-US" dirty="0">
+                <a:latin typeface="Courier New" panose="02070309020205020404" pitchFamily="49" charset="0"/>
+                <a:cs typeface="Courier New" panose="02070309020205020404" pitchFamily="49" charset="0"/>
+              </a:rPr>
+              <a:t>{parameter</a:t>
+            </a:r>
+            <a:r>
+              <a:rPr lang="sk-SK" dirty="0">
+                <a:latin typeface="Courier New" panose="02070309020205020404" pitchFamily="49" charset="0"/>
+                <a:cs typeface="Courier New" panose="02070309020205020404" pitchFamily="49" charset="0"/>
+              </a:rPr>
+              <a:t>1,parameter2</a:t>
+            </a:r>
+            <a:r>
+              <a:rPr lang="en-US" dirty="0">
+                <a:latin typeface="Courier New" panose="02070309020205020404" pitchFamily="49" charset="0"/>
+                <a:cs typeface="Courier New" panose="02070309020205020404" pitchFamily="49" charset="0"/>
+              </a:rPr>
+              <a:t>}</a:t>
+            </a:r>
+            <a:r>
+              <a:rPr lang="sk-SK" dirty="0">
+                <a:latin typeface="Courier New" panose="02070309020205020404" pitchFamily="49" charset="0"/>
+                <a:cs typeface="Courier New" panose="02070309020205020404" pitchFamily="49" charset="0"/>
+              </a:rPr>
+              <a:t> </a:t>
+            </a:r>
+          </a:p>
+          <a:p>
+            <a:pPr marL="0" indent="0">
+              <a:buNone/>
+            </a:pPr>
             <a:endParaRPr lang="en-US" b="1" dirty="0">
               <a:latin typeface="Courier New" panose="02070309020205020404" pitchFamily="49" charset="0"/>
               <a:cs typeface="Courier New" panose="02070309020205020404" pitchFamily="49" charset="0"/>
@@ -14626,7 +14858,7 @@
             </a:pPr>
             <a:r>
               <a:rPr lang="en-US"/>
-              <a:t>July 11, 2016</a:t>
+              <a:t>Dec. 2019</a:t>
             </a:r>
             <a:endParaRPr lang="en-US" dirty="0"/>
           </a:p>
@@ -14652,7 +14884,7 @@
             </a:pPr>
             <a:r>
               <a:rPr lang="en-US"/>
-              <a:t>23rd International Congress on Sound &amp; Vibration</a:t>
+              <a:t>LaTeX Seminár</a:t>
             </a:r>
             <a:endParaRPr lang="en-US" dirty="0"/>
           </a:p>
@@ -14760,7 +14992,7 @@
             </a:pPr>
             <a:r>
               <a:rPr lang="en-US"/>
-              <a:t>July 11, 2016</a:t>
+              <a:t>Dec. 2019</a:t>
             </a:r>
             <a:endParaRPr lang="en-US" dirty="0"/>
           </a:p>
@@ -14786,7 +15018,7 @@
             </a:pPr>
             <a:r>
               <a:rPr lang="en-US"/>
-              <a:t>23rd International Congress on Sound &amp; Vibration</a:t>
+              <a:t>LaTeX Seminár</a:t>
             </a:r>
             <a:endParaRPr lang="en-US" dirty="0"/>
           </a:p>
@@ -15111,7 +15343,7 @@
             </a:pPr>
             <a:r>
               <a:rPr lang="en-US"/>
-              <a:t>July 11, 2016</a:t>
+              <a:t>Dec. 2019</a:t>
             </a:r>
             <a:endParaRPr lang="en-US" dirty="0"/>
           </a:p>
@@ -15137,7 +15369,7 @@
             </a:pPr>
             <a:r>
               <a:rPr lang="en-US"/>
-              <a:t>23rd International Congress on Sound &amp; Vibration</a:t>
+              <a:t>LaTeX Seminár</a:t>
             </a:r>
             <a:endParaRPr lang="en-US" dirty="0"/>
           </a:p>
@@ -15491,7 +15723,7 @@
             </a:pPr>
             <a:r>
               <a:rPr lang="en-US"/>
-              <a:t>July 11, 2016</a:t>
+              <a:t>Dec. 2019</a:t>
             </a:r>
             <a:endParaRPr lang="en-US" dirty="0"/>
           </a:p>
@@ -15517,7 +15749,7 @@
             </a:pPr>
             <a:r>
               <a:rPr lang="en-US"/>
-              <a:t>23rd International Congress on Sound &amp; Vibration</a:t>
+              <a:t>LaTeX Seminár</a:t>
             </a:r>
             <a:endParaRPr lang="en-US" dirty="0"/>
           </a:p>
@@ -15896,7 +16128,7 @@
             </a:pPr>
             <a:r>
               <a:rPr lang="en-US"/>
-              <a:t>July 11, 2016</a:t>
+              <a:t>Dec. 2019</a:t>
             </a:r>
             <a:endParaRPr lang="en-US" dirty="0"/>
           </a:p>
@@ -15922,7 +16154,7 @@
             </a:pPr>
             <a:r>
               <a:rPr lang="en-US"/>
-              <a:t>23rd International Congress on Sound &amp; Vibration</a:t>
+              <a:t>LaTeX Seminár</a:t>
             </a:r>
             <a:endParaRPr lang="en-US" dirty="0"/>
           </a:p>
@@ -16234,7 +16466,7 @@
             </a:pPr>
             <a:r>
               <a:rPr lang="en-US"/>
-              <a:t>July 11, 2016</a:t>
+              <a:t>Dec. 2019</a:t>
             </a:r>
             <a:endParaRPr lang="en-US" dirty="0"/>
           </a:p>
@@ -16260,7 +16492,7 @@
             </a:pPr>
             <a:r>
               <a:rPr lang="en-US"/>
-              <a:t>23rd International Congress on Sound &amp; Vibration</a:t>
+              <a:t>LaTeX Seminár</a:t>
             </a:r>
             <a:endParaRPr lang="en-US" dirty="0"/>
           </a:p>
@@ -16608,7 +16840,7 @@
             </a:pPr>
             <a:r>
               <a:rPr lang="en-US"/>
-              <a:t>July 11, 2016</a:t>
+              <a:t>Dec. 2019</a:t>
             </a:r>
             <a:endParaRPr lang="en-US" dirty="0"/>
           </a:p>
@@ -16634,7 +16866,7 @@
             </a:pPr>
             <a:r>
               <a:rPr lang="en-US"/>
-              <a:t>23rd International Congress on Sound &amp; Vibration</a:t>
+              <a:t>LaTeX Seminár</a:t>
             </a:r>
             <a:endParaRPr lang="en-US" dirty="0"/>
           </a:p>
@@ -17062,6 +17294,13 @@
                 <a:cs typeface="Courier New" panose="02070309020205020404" pitchFamily="49" charset="0"/>
               </a:rPr>
               <a:t>\end{table</a:t>
+            </a:r>
+            <a:r>
+              <a:rPr lang="en-US" dirty="0">
+                <a:latin typeface="Courier New" panose="02070309020205020404" pitchFamily="49" charset="0"/>
+                <a:cs typeface="Courier New" panose="02070309020205020404" pitchFamily="49" charset="0"/>
+              </a:rPr>
+              <a:t>}</a:t>
             </a:r>
             <a:endParaRPr lang="sk-SK" dirty="0">
               <a:cs typeface="Courier New" panose="02070309020205020404" pitchFamily="49" charset="0"/>
@@ -17142,7 +17381,7 @@
             </a:pPr>
             <a:r>
               <a:rPr lang="en-US"/>
-              <a:t>July 11, 2016</a:t>
+              <a:t>Dec. 2019</a:t>
             </a:r>
             <a:endParaRPr lang="en-US" dirty="0"/>
           </a:p>
@@ -17168,7 +17407,7 @@
             </a:pPr>
             <a:r>
               <a:rPr lang="en-US"/>
-              <a:t>23rd International Congress on Sound &amp; Vibration</a:t>
+              <a:t>LaTeX Seminár</a:t>
             </a:r>
             <a:endParaRPr lang="en-US" dirty="0"/>
           </a:p>
@@ -17598,7 +17837,7 @@
             </a:pPr>
             <a:r>
               <a:rPr lang="en-US"/>
-              <a:t>July 11, 2016</a:t>
+              <a:t>Dec. 2019</a:t>
             </a:r>
             <a:endParaRPr lang="en-US" dirty="0"/>
           </a:p>
@@ -17624,7 +17863,7 @@
             </a:pPr>
             <a:r>
               <a:rPr lang="en-US"/>
-              <a:t>23rd International Congress on Sound &amp; Vibration</a:t>
+              <a:t>LaTeX Seminár</a:t>
             </a:r>
             <a:endParaRPr lang="en-US" dirty="0"/>
           </a:p>
@@ -18036,7 +18275,7 @@
             </a:pPr>
             <a:r>
               <a:rPr lang="en-US"/>
-              <a:t>July 11, 2016</a:t>
+              <a:t>Dec. 2019</a:t>
             </a:r>
             <a:endParaRPr lang="en-US" dirty="0"/>
           </a:p>
@@ -18062,7 +18301,7 @@
             </a:pPr>
             <a:r>
               <a:rPr lang="en-US"/>
-              <a:t>23rd International Congress on Sound &amp; Vibration</a:t>
+              <a:t>LaTeX Seminár</a:t>
             </a:r>
             <a:endParaRPr lang="en-US" dirty="0"/>
           </a:p>
@@ -18412,7 +18651,7 @@
             </a:pPr>
             <a:r>
               <a:rPr lang="en-US"/>
-              <a:t>July 11, 2016</a:t>
+              <a:t>Dec. 2019</a:t>
             </a:r>
             <a:endParaRPr lang="en-US" dirty="0"/>
           </a:p>
@@ -18438,7 +18677,7 @@
             </a:pPr>
             <a:r>
               <a:rPr lang="en-US"/>
-              <a:t>23rd International Congress on Sound &amp; Vibration</a:t>
+              <a:t>LaTeX Seminár</a:t>
             </a:r>
             <a:endParaRPr lang="en-US" dirty="0"/>
           </a:p>
@@ -19519,7 +19758,7 @@
             </a:pPr>
             <a:r>
               <a:rPr lang="en-US"/>
-              <a:t>July 11, 2016</a:t>
+              <a:t>Dec. 2019</a:t>
             </a:r>
             <a:endParaRPr lang="en-US" dirty="0"/>
           </a:p>
@@ -19545,7 +19784,7 @@
             </a:pPr>
             <a:r>
               <a:rPr lang="en-US"/>
-              <a:t>23rd International Congress on Sound &amp; Vibration</a:t>
+              <a:t>LaTeX Seminár</a:t>
             </a:r>
             <a:endParaRPr lang="en-US" dirty="0"/>
           </a:p>
@@ -19723,7 +19962,7 @@
             </a:pPr>
             <a:r>
               <a:rPr lang="en-US"/>
-              <a:t>July 11, 2016</a:t>
+              <a:t>Dec. 2019</a:t>
             </a:r>
             <a:endParaRPr lang="en-US" dirty="0"/>
           </a:p>
@@ -19749,7 +19988,7 @@
             </a:pPr>
             <a:r>
               <a:rPr lang="en-US"/>
-              <a:t>23rd International Congress on Sound &amp; Vibration</a:t>
+              <a:t>LaTeX Seminár</a:t>
             </a:r>
             <a:endParaRPr lang="en-US" dirty="0"/>
           </a:p>
@@ -20109,7 +20348,7 @@
             </a:pPr>
             <a:r>
               <a:rPr lang="en-US"/>
-              <a:t>July 11, 2016</a:t>
+              <a:t>Dec. 2019</a:t>
             </a:r>
             <a:endParaRPr lang="en-US" dirty="0"/>
           </a:p>
@@ -20135,7 +20374,7 @@
             </a:pPr>
             <a:r>
               <a:rPr lang="en-US"/>
-              <a:t>23rd International Congress on Sound &amp; Vibration</a:t>
+              <a:t>LaTeX Seminár</a:t>
             </a:r>
             <a:endParaRPr lang="en-US" dirty="0"/>
           </a:p>
@@ -20289,7 +20528,7 @@
             </a:pPr>
             <a:r>
               <a:rPr lang="en-US"/>
-              <a:t>July 11, 2016</a:t>
+              <a:t>Dec. 2019</a:t>
             </a:r>
             <a:endParaRPr lang="en-US" dirty="0"/>
           </a:p>
@@ -20315,7 +20554,7 @@
             </a:pPr>
             <a:r>
               <a:rPr lang="en-US"/>
-              <a:t>23rd International Congress on Sound &amp; Vibration</a:t>
+              <a:t>LaTeX Seminár</a:t>
             </a:r>
             <a:endParaRPr lang="en-US" dirty="0"/>
           </a:p>
@@ -20453,18 +20692,18 @@
               <a:t>@</a:t>
             </a:r>
             <a:r>
-              <a:rPr lang="pl-PL" dirty="0" err="1">
-                <a:latin typeface="Courier New" panose="02070309020205020404" pitchFamily="49" charset="0"/>
-                <a:cs typeface="Courier New" panose="02070309020205020404" pitchFamily="49" charset="0"/>
-              </a:rPr>
-              <a:t>Book</a:t>
+              <a:rPr lang="en-US" dirty="0">
+                <a:latin typeface="Courier New" panose="02070309020205020404" pitchFamily="49" charset="0"/>
+                <a:cs typeface="Courier New" panose="02070309020205020404" pitchFamily="49" charset="0"/>
+              </a:rPr>
+              <a:t>b</a:t>
             </a:r>
             <a:r>
               <a:rPr lang="pl-PL" dirty="0">
                 <a:latin typeface="Courier New" panose="02070309020205020404" pitchFamily="49" charset="0"/>
                 <a:cs typeface="Courier New" panose="02070309020205020404" pitchFamily="49" charset="0"/>
               </a:rPr>
-              <a:t>{Eykhoff84,</a:t>
+              <a:t>ook{Eykhoff84,</a:t>
             </a:r>
           </a:p>
           <a:p>
@@ -20741,7 +20980,7 @@
             </a:pPr>
             <a:r>
               <a:rPr lang="en-US"/>
-              <a:t>July 11, 2016</a:t>
+              <a:t>Dec. 2019</a:t>
             </a:r>
             <a:endParaRPr lang="en-US" dirty="0"/>
           </a:p>
@@ -20767,7 +21006,7 @@
             </a:pPr>
             <a:r>
               <a:rPr lang="en-US"/>
-              <a:t>23rd International Congress on Sound &amp; Vibration</a:t>
+              <a:t>LaTeX Seminár</a:t>
             </a:r>
             <a:endParaRPr lang="en-US" dirty="0"/>
           </a:p>
@@ -21312,7 +21551,7 @@
             </a:pPr>
             <a:r>
               <a:rPr lang="en-US"/>
-              <a:t>July 11, 2016</a:t>
+              <a:t>Dec. 2019</a:t>
             </a:r>
             <a:endParaRPr lang="en-US" dirty="0"/>
           </a:p>
@@ -21338,7 +21577,7 @@
             </a:pPr>
             <a:r>
               <a:rPr lang="en-US"/>
-              <a:t>23rd International Congress on Sound &amp; Vibration</a:t>
+              <a:t>LaTeX Seminár</a:t>
             </a:r>
             <a:endParaRPr lang="en-US" dirty="0"/>
           </a:p>
@@ -21897,7 +22136,7 @@
             </a:pPr>
             <a:r>
               <a:rPr lang="en-US"/>
-              <a:t>July 11, 2016</a:t>
+              <a:t>Dec. 2019</a:t>
             </a:r>
             <a:endParaRPr lang="en-US" dirty="0"/>
           </a:p>
@@ -21923,7 +22162,7 @@
             </a:pPr>
             <a:r>
               <a:rPr lang="en-US"/>
-              <a:t>23rd International Congress on Sound &amp; Vibration</a:t>
+              <a:t>LaTeX Seminár</a:t>
             </a:r>
             <a:endParaRPr lang="en-US" dirty="0"/>
           </a:p>
@@ -22119,7 +22358,7 @@
             </a:pPr>
             <a:r>
               <a:rPr lang="en-US"/>
-              <a:t>July 11, 2016</a:t>
+              <a:t>Dec. 2019</a:t>
             </a:r>
             <a:endParaRPr lang="en-US" dirty="0"/>
           </a:p>
@@ -22145,7 +22384,7 @@
             </a:pPr>
             <a:r>
               <a:rPr lang="en-US"/>
-              <a:t>23rd International Congress on Sound &amp; Vibration</a:t>
+              <a:t>LaTeX Seminár</a:t>
             </a:r>
             <a:endParaRPr lang="en-US" dirty="0"/>
           </a:p>
@@ -22192,7 +22431,7 @@
         </p:nvSpPr>
         <p:spPr>
           <a:xfrm>
-            <a:off x="179388" y="980728"/>
+            <a:off x="247016" y="980728"/>
             <a:ext cx="8785225" cy="5040560"/>
           </a:xfrm>
         </p:spPr>
@@ -22502,7 +22741,7 @@
             </a:pPr>
             <a:r>
               <a:rPr lang="en-US"/>
-              <a:t>July 11, 2016</a:t>
+              <a:t>Dec. 2019</a:t>
             </a:r>
             <a:endParaRPr lang="en-US" dirty="0"/>
           </a:p>
@@ -22528,7 +22767,7 @@
             </a:pPr>
             <a:r>
               <a:rPr lang="en-US"/>
-              <a:t>23rd International Congress on Sound &amp; Vibration</a:t>
+              <a:t>LaTeX Seminár</a:t>
             </a:r>
             <a:endParaRPr lang="en-US" dirty="0"/>
           </a:p>
@@ -22851,7 +23090,7 @@
             </a:pPr>
             <a:r>
               <a:rPr lang="en-US"/>
-              <a:t>July 11, 2016</a:t>
+              <a:t>Dec. 2019</a:t>
             </a:r>
             <a:endParaRPr lang="en-US" dirty="0"/>
           </a:p>
@@ -22877,7 +23116,7 @@
             </a:pPr>
             <a:r>
               <a:rPr lang="en-US"/>
-              <a:t>23rd International Congress on Sound &amp; Vibration</a:t>
+              <a:t>LaTeX Seminár</a:t>
             </a:r>
             <a:endParaRPr lang="en-US" dirty="0"/>
           </a:p>
@@ -23280,7 +23519,7 @@
             </a:pPr>
             <a:r>
               <a:rPr lang="en-US"/>
-              <a:t>July 11, 2016</a:t>
+              <a:t>Dec. 2019</a:t>
             </a:r>
             <a:endParaRPr lang="en-US" dirty="0"/>
           </a:p>
@@ -23306,7 +23545,7 @@
             </a:pPr>
             <a:r>
               <a:rPr lang="en-US"/>
-              <a:t>23rd International Congress on Sound &amp; Vibration</a:t>
+              <a:t>LaTeX Seminár</a:t>
             </a:r>
             <a:endParaRPr lang="en-US" dirty="0"/>
           </a:p>
@@ -23998,7 +24237,7 @@
             </a:pPr>
             <a:r>
               <a:rPr lang="en-US"/>
-              <a:t>July 11, 2016</a:t>
+              <a:t>Dec. 2019</a:t>
             </a:r>
             <a:endParaRPr lang="en-US" dirty="0"/>
           </a:p>
@@ -24024,7 +24263,7 @@
             </a:pPr>
             <a:r>
               <a:rPr lang="en-US"/>
-              <a:t>23rd International Congress on Sound &amp; Vibration</a:t>
+              <a:t>LaTeX Seminár</a:t>
             </a:r>
             <a:endParaRPr lang="en-US" dirty="0"/>
           </a:p>
@@ -24406,14 +24645,35 @@
                 <a:latin typeface="Courier New" panose="02070309020205020404" pitchFamily="49" charset="0"/>
                 <a:cs typeface="Courier New" panose="02070309020205020404" pitchFamily="49" charset="0"/>
               </a:rPr>
-              <a:t> (napr. </a:t>
+              <a:t> (</a:t>
             </a:r>
             <a:r>
               <a:rPr lang="en-US" dirty="0" err="1">
                 <a:latin typeface="Courier New" panose="02070309020205020404" pitchFamily="49" charset="0"/>
                 <a:cs typeface="Courier New" panose="02070309020205020404" pitchFamily="49" charset="0"/>
               </a:rPr>
-              <a:t>Kniznice</a:t>
+              <a:t>napr</a:t>
+            </a:r>
+            <a:r>
+              <a:rPr lang="en-US" dirty="0">
+                <a:latin typeface="Courier New" panose="02070309020205020404" pitchFamily="49" charset="0"/>
+                <a:cs typeface="Courier New" panose="02070309020205020404" pitchFamily="49" charset="0"/>
+              </a:rPr>
+              <a:t>.</a:t>
+            </a:r>
+            <a:r>
+              <a:rPr lang="sk-SK" dirty="0">
+                <a:latin typeface="Courier New" panose="02070309020205020404" pitchFamily="49" charset="0"/>
+                <a:cs typeface="Courier New" panose="02070309020205020404" pitchFamily="49" charset="0"/>
+              </a:rPr>
+              <a:t> </a:t>
+            </a:r>
+            <a:r>
+              <a:rPr lang="sk-SK" dirty="0" err="1">
+                <a:latin typeface="Courier New" panose="02070309020205020404" pitchFamily="49" charset="0"/>
+                <a:cs typeface="Courier New" panose="02070309020205020404" pitchFamily="49" charset="0"/>
+              </a:rPr>
+              <a:t>baliky</a:t>
             </a:r>
             <a:r>
               <a:rPr lang="en-US" dirty="0">
@@ -24543,7 +24803,7 @@
             </a:pPr>
             <a:r>
               <a:rPr lang="en-US"/>
-              <a:t>July 11, 2016</a:t>
+              <a:t>Dec. 2019</a:t>
             </a:r>
             <a:endParaRPr lang="en-US" dirty="0"/>
           </a:p>
@@ -24569,7 +24829,7 @@
             </a:pPr>
             <a:r>
               <a:rPr lang="en-US"/>
-              <a:t>23rd International Congress on Sound &amp; Vibration</a:t>
+              <a:t>LaTeX Seminár</a:t>
             </a:r>
             <a:endParaRPr lang="en-US" dirty="0"/>
           </a:p>
@@ -24802,7 +25062,7 @@
             </a:pPr>
             <a:r>
               <a:rPr lang="en-US"/>
-              <a:t>July 11, 2016</a:t>
+              <a:t>Dec. 2019</a:t>
             </a:r>
             <a:endParaRPr lang="en-US" dirty="0"/>
           </a:p>
@@ -24828,7 +25088,7 @@
             </a:pPr>
             <a:r>
               <a:rPr lang="en-US"/>
-              <a:t>23rd International Congress on Sound &amp; Vibration</a:t>
+              <a:t>LaTeX Seminár</a:t>
             </a:r>
             <a:endParaRPr lang="en-US" dirty="0"/>
           </a:p>
@@ -25074,7 +25334,7 @@
             </a:pPr>
             <a:r>
               <a:rPr lang="en-US"/>
-              <a:t>July 11, 2016</a:t>
+              <a:t>Dec. 2019</a:t>
             </a:r>
             <a:endParaRPr lang="en-US" dirty="0"/>
           </a:p>
@@ -25100,7 +25360,7 @@
             </a:pPr>
             <a:r>
               <a:rPr lang="en-US"/>
-              <a:t>23rd International Congress on Sound &amp; Vibration</a:t>
+              <a:t>LaTeX Seminár</a:t>
             </a:r>
             <a:endParaRPr lang="en-US" dirty="0"/>
           </a:p>
@@ -25481,7 +25741,7 @@
             </a:pPr>
             <a:r>
               <a:rPr lang="en-US"/>
-              <a:t>July 11, 2016</a:t>
+              <a:t>Dec. 2019</a:t>
             </a:r>
             <a:endParaRPr lang="en-US" dirty="0"/>
           </a:p>
@@ -25507,7 +25767,7 @@
             </a:pPr>
             <a:r>
               <a:rPr lang="en-US"/>
-              <a:t>23rd International Congress on Sound &amp; Vibration</a:t>
+              <a:t>LaTeX Seminár</a:t>
             </a:r>
             <a:endParaRPr lang="en-US" dirty="0"/>
           </a:p>

</xml_diff>